<commit_message>
Version 1.2: Patch notes in README
</commit_message>
<xml_diff>
--- a/example/template.pptx
+++ b/example/template.pptx
@@ -5,10 +5,10 @@
     <p:sldMasterId id="2147483648" r:id="rId4"/>
   </p:sldMasterIdLst>
   <p:notesMasterIdLst>
-    <p:notesMasterId r:id="rId13"/>
+    <p:notesMasterId r:id="rId14"/>
   </p:notesMasterIdLst>
   <p:handoutMasterIdLst>
-    <p:handoutMasterId r:id="rId14"/>
+    <p:handoutMasterId r:id="rId15"/>
   </p:handoutMasterIdLst>
   <p:sldIdLst>
     <p:sldId id="256" r:id="rId5"/>
@@ -19,6 +19,7 @@
     <p:sldId id="262" r:id="rId10"/>
     <p:sldId id="263" r:id="rId11"/>
     <p:sldId id="264" r:id="rId12"/>
+    <p:sldId id="265" r:id="rId13"/>
   </p:sldIdLst>
   <p:sldSz cx="12192000" cy="6858000"/>
   <p:notesSz cx="6858000" cy="9144000"/>
@@ -154,7 +155,7 @@
 <file path=ppt/revisionInfo.xml><?xml version="1.0" encoding="utf-8"?>
 <p1510:revInfo xmlns:a="http://schemas.openxmlformats.org/drawingml/2006/main" xmlns:r="http://schemas.openxmlformats.org/officeDocument/2006/relationships" xmlns:p1510="http://schemas.microsoft.com/office/powerpoint/2015/10/main">
   <p1510:revLst>
-    <p1510:client id="{B876D7DA-DFE9-446E-BF99-95F4DD9EE379}" v="29" dt="2025-04-17T09:59:24.528"/>
+    <p1510:client id="{B876D7DA-DFE9-446E-BF99-95F4DD9EE379}" v="33" dt="2025-04-30T10:56:35.537"/>
   </p1510:revLst>
 </p1510:revInfo>
 </file>
@@ -219,7 +220,7 @@
   <pc:docChgLst>
     <pc:chgData name="Vermeulen - van Gent, Sander" userId="e08259fd-81d2-4a86-9b20-28ba02d67a18" providerId="ADAL" clId="{B876D7DA-DFE9-446E-BF99-95F4DD9EE379}"/>
     <pc:docChg chg="undo custSel addSld delSld modSld modMainMaster">
-      <pc:chgData name="Vermeulen - van Gent, Sander" userId="e08259fd-81d2-4a86-9b20-28ba02d67a18" providerId="ADAL" clId="{B876D7DA-DFE9-446E-BF99-95F4DD9EE379}" dt="2025-04-17T09:59:29.669" v="148" actId="20577"/>
+      <pc:chgData name="Vermeulen - van Gent, Sander" userId="e08259fd-81d2-4a86-9b20-28ba02d67a18" providerId="ADAL" clId="{B876D7DA-DFE9-446E-BF99-95F4DD9EE379}" dt="2025-04-30T10:59:21.168" v="212" actId="14430"/>
       <pc:docMkLst>
         <pc:docMk/>
       </pc:docMkLst>
@@ -264,68 +265,98 @@
           <pc:docMk/>
           <pc:sldMk cId="1769976180" sldId="264"/>
         </pc:sldMkLst>
-        <pc:spChg chg="del">
-          <ac:chgData name="Vermeulen - van Gent, Sander" userId="e08259fd-81d2-4a86-9b20-28ba02d67a18" providerId="ADAL" clId="{B876D7DA-DFE9-446E-BF99-95F4DD9EE379}" dt="2025-04-17T08:00:16.585" v="133" actId="700"/>
+      </pc:sldChg>
+      <pc:sldChg chg="add del">
+        <pc:chgData name="Vermeulen - van Gent, Sander" userId="e08259fd-81d2-4a86-9b20-28ba02d67a18" providerId="ADAL" clId="{B876D7DA-DFE9-446E-BF99-95F4DD9EE379}" dt="2025-04-30T09:53:32.545" v="162" actId="2890"/>
+        <pc:sldMkLst>
+          <pc:docMk/>
+          <pc:sldMk cId="1153038210" sldId="265"/>
+        </pc:sldMkLst>
+      </pc:sldChg>
+      <pc:sldChg chg="addSp delSp modSp new mod modClrScheme chgLayout">
+        <pc:chgData name="Vermeulen - van Gent, Sander" userId="e08259fd-81d2-4a86-9b20-28ba02d67a18" providerId="ADAL" clId="{B876D7DA-DFE9-446E-BF99-95F4DD9EE379}" dt="2025-04-30T10:18:59.726" v="207" actId="478"/>
+        <pc:sldMkLst>
+          <pc:docMk/>
+          <pc:sldMk cId="1857189599" sldId="265"/>
+        </pc:sldMkLst>
+        <pc:spChg chg="add del mod">
+          <ac:chgData name="Vermeulen - van Gent, Sander" userId="e08259fd-81d2-4a86-9b20-28ba02d67a18" providerId="ADAL" clId="{B876D7DA-DFE9-446E-BF99-95F4DD9EE379}" dt="2025-04-30T10:18:59.726" v="207" actId="478"/>
           <ac:spMkLst>
             <pc:docMk/>
-            <pc:sldMk cId="1769976180" sldId="264"/>
-            <ac:spMk id="2" creationId="{F164BDDB-DF0F-5DFE-BC10-B8A6885C3D92}"/>
+            <pc:sldMk cId="1857189599" sldId="265"/>
+            <ac:spMk id="2" creationId="{8901271D-6AF1-65EA-C49A-E22D16CEF927}"/>
           </ac:spMkLst>
         </pc:spChg>
-        <pc:spChg chg="del">
-          <ac:chgData name="Vermeulen - van Gent, Sander" userId="e08259fd-81d2-4a86-9b20-28ba02d67a18" providerId="ADAL" clId="{B876D7DA-DFE9-446E-BF99-95F4DD9EE379}" dt="2025-04-17T08:00:16.585" v="133" actId="700"/>
+        <pc:spChg chg="del mod ord">
+          <ac:chgData name="Vermeulen - van Gent, Sander" userId="e08259fd-81d2-4a86-9b20-28ba02d67a18" providerId="ADAL" clId="{B876D7DA-DFE9-446E-BF99-95F4DD9EE379}" dt="2025-04-30T09:55:24.174" v="174" actId="700"/>
           <ac:spMkLst>
             <pc:docMk/>
-            <pc:sldMk cId="1769976180" sldId="264"/>
-            <ac:spMk id="3" creationId="{7C3DBDC4-A6BF-B5A0-001A-D7E94C271409}"/>
+            <pc:sldMk cId="1857189599" sldId="265"/>
+            <ac:spMk id="2" creationId="{947A568B-0E1E-CABE-09BB-D86A2113249A}"/>
           </ac:spMkLst>
         </pc:spChg>
-        <pc:spChg chg="del">
-          <ac:chgData name="Vermeulen - van Gent, Sander" userId="e08259fd-81d2-4a86-9b20-28ba02d67a18" providerId="ADAL" clId="{B876D7DA-DFE9-446E-BF99-95F4DD9EE379}" dt="2025-04-17T08:00:16.585" v="133" actId="700"/>
+        <pc:spChg chg="del mod ord">
+          <ac:chgData name="Vermeulen - van Gent, Sander" userId="e08259fd-81d2-4a86-9b20-28ba02d67a18" providerId="ADAL" clId="{B876D7DA-DFE9-446E-BF99-95F4DD9EE379}" dt="2025-04-30T09:55:24.174" v="174" actId="700"/>
           <ac:spMkLst>
             <pc:docMk/>
-            <pc:sldMk cId="1769976180" sldId="264"/>
-            <ac:spMk id="4" creationId="{AFCDB6EF-563D-1007-2FD8-D6DD6DAE66AA}"/>
+            <pc:sldMk cId="1857189599" sldId="265"/>
+            <ac:spMk id="3" creationId="{D1202DE5-F5D2-3DD0-F29C-5F5A56E23CD3}"/>
           </ac:spMkLst>
         </pc:spChg>
-        <pc:spChg chg="del">
-          <ac:chgData name="Vermeulen - van Gent, Sander" userId="e08259fd-81d2-4a86-9b20-28ba02d67a18" providerId="ADAL" clId="{B876D7DA-DFE9-446E-BF99-95F4DD9EE379}" dt="2025-04-17T08:00:16.585" v="133" actId="700"/>
+        <pc:spChg chg="del mod ord">
+          <ac:chgData name="Vermeulen - van Gent, Sander" userId="e08259fd-81d2-4a86-9b20-28ba02d67a18" providerId="ADAL" clId="{B876D7DA-DFE9-446E-BF99-95F4DD9EE379}" dt="2025-04-30T09:55:24.174" v="174" actId="700"/>
           <ac:spMkLst>
             <pc:docMk/>
-            <pc:sldMk cId="1769976180" sldId="264"/>
-            <ac:spMk id="5" creationId="{23264F67-0DC7-C588-1FDC-92090CB5AFF6}"/>
+            <pc:sldMk cId="1857189599" sldId="265"/>
+            <ac:spMk id="4" creationId="{EE76D8F9-A023-6C5E-78FD-39A4F6C552DC}"/>
+          </ac:spMkLst>
+        </pc:spChg>
+        <pc:spChg chg="del mod ord">
+          <ac:chgData name="Vermeulen - van Gent, Sander" userId="e08259fd-81d2-4a86-9b20-28ba02d67a18" providerId="ADAL" clId="{B876D7DA-DFE9-446E-BF99-95F4DD9EE379}" dt="2025-04-30T09:55:24.174" v="174" actId="700"/>
+          <ac:spMkLst>
+            <pc:docMk/>
+            <pc:sldMk cId="1857189599" sldId="265"/>
+            <ac:spMk id="5" creationId="{AE0BF931-F507-CD70-1476-B24FE3D0F127}"/>
+          </ac:spMkLst>
+        </pc:spChg>
+        <pc:spChg chg="add del mod ord">
+          <ac:chgData name="Vermeulen - van Gent, Sander" userId="e08259fd-81d2-4a86-9b20-28ba02d67a18" providerId="ADAL" clId="{B876D7DA-DFE9-446E-BF99-95F4DD9EE379}" dt="2025-04-30T09:55:26.569" v="175" actId="478"/>
+          <ac:spMkLst>
+            <pc:docMk/>
+            <pc:sldMk cId="1857189599" sldId="265"/>
+            <ac:spMk id="6" creationId="{A204A25F-A52D-3841-CC82-1E0EB4A7E756}"/>
+          </ac:spMkLst>
+        </pc:spChg>
+        <pc:spChg chg="add del mod ord">
+          <ac:chgData name="Vermeulen - van Gent, Sander" userId="e08259fd-81d2-4a86-9b20-28ba02d67a18" providerId="ADAL" clId="{B876D7DA-DFE9-446E-BF99-95F4DD9EE379}" dt="2025-04-30T09:55:26.569" v="175" actId="478"/>
+          <ac:spMkLst>
+            <pc:docMk/>
+            <pc:sldMk cId="1857189599" sldId="265"/>
+            <ac:spMk id="7" creationId="{16870BFC-B9D9-E878-FE94-A1EA15C3D097}"/>
+          </ac:spMkLst>
+        </pc:spChg>
+        <pc:spChg chg="add del mod ord">
+          <ac:chgData name="Vermeulen - van Gent, Sander" userId="e08259fd-81d2-4a86-9b20-28ba02d67a18" providerId="ADAL" clId="{B876D7DA-DFE9-446E-BF99-95F4DD9EE379}" dt="2025-04-30T09:55:26.569" v="175" actId="478"/>
+          <ac:spMkLst>
+            <pc:docMk/>
+            <pc:sldMk cId="1857189599" sldId="265"/>
+            <ac:spMk id="8" creationId="{5AD78278-87DF-8D88-1D8D-4F22BEB8DDD1}"/>
+          </ac:spMkLst>
+        </pc:spChg>
+        <pc:spChg chg="add del mod ord">
+          <ac:chgData name="Vermeulen - van Gent, Sander" userId="e08259fd-81d2-4a86-9b20-28ba02d67a18" providerId="ADAL" clId="{B876D7DA-DFE9-446E-BF99-95F4DD9EE379}" dt="2025-04-30T09:55:26.569" v="175" actId="478"/>
+          <ac:spMkLst>
+            <pc:docMk/>
+            <pc:sldMk cId="1857189599" sldId="265"/>
+            <ac:spMk id="9" creationId="{B4633C2F-6705-FB5A-72B4-A08FEB0AC4C6}"/>
           </ac:spMkLst>
         </pc:spChg>
         <pc:spChg chg="add del mod">
-          <ac:chgData name="Vermeulen - van Gent, Sander" userId="e08259fd-81d2-4a86-9b20-28ba02d67a18" providerId="ADAL" clId="{B876D7DA-DFE9-446E-BF99-95F4DD9EE379}" dt="2025-04-17T08:00:18.406" v="134" actId="478"/>
+          <ac:chgData name="Vermeulen - van Gent, Sander" userId="e08259fd-81d2-4a86-9b20-28ba02d67a18" providerId="ADAL" clId="{B876D7DA-DFE9-446E-BF99-95F4DD9EE379}" dt="2025-04-30T09:59:45.765" v="205" actId="478"/>
           <ac:spMkLst>
             <pc:docMk/>
-            <pc:sldMk cId="1769976180" sldId="264"/>
-            <ac:spMk id="6" creationId="{A6296924-FD59-FD14-883D-E39A37262778}"/>
-          </ac:spMkLst>
-        </pc:spChg>
-        <pc:spChg chg="add del mod">
-          <ac:chgData name="Vermeulen - van Gent, Sander" userId="e08259fd-81d2-4a86-9b20-28ba02d67a18" providerId="ADAL" clId="{B876D7DA-DFE9-446E-BF99-95F4DD9EE379}" dt="2025-04-17T08:00:18.406" v="134" actId="478"/>
-          <ac:spMkLst>
-            <pc:docMk/>
-            <pc:sldMk cId="1769976180" sldId="264"/>
-            <ac:spMk id="7" creationId="{B99403B8-3DCA-3298-B590-4356252789AF}"/>
-          </ac:spMkLst>
-        </pc:spChg>
-        <pc:spChg chg="add del mod">
-          <ac:chgData name="Vermeulen - van Gent, Sander" userId="e08259fd-81d2-4a86-9b20-28ba02d67a18" providerId="ADAL" clId="{B876D7DA-DFE9-446E-BF99-95F4DD9EE379}" dt="2025-04-17T08:00:18.406" v="134" actId="478"/>
-          <ac:spMkLst>
-            <pc:docMk/>
-            <pc:sldMk cId="1769976180" sldId="264"/>
-            <ac:spMk id="8" creationId="{C078BB40-B759-C296-6126-8FA043865572}"/>
-          </ac:spMkLst>
-        </pc:spChg>
-        <pc:spChg chg="add del mod">
-          <ac:chgData name="Vermeulen - van Gent, Sander" userId="e08259fd-81d2-4a86-9b20-28ba02d67a18" providerId="ADAL" clId="{B876D7DA-DFE9-446E-BF99-95F4DD9EE379}" dt="2025-04-17T08:00:18.406" v="134" actId="478"/>
-          <ac:spMkLst>
-            <pc:docMk/>
-            <pc:sldMk cId="1769976180" sldId="264"/>
-            <ac:spMk id="9" creationId="{B5B039A0-DB41-E178-126F-00041E1F090A}"/>
+            <pc:sldMk cId="1857189599" sldId="265"/>
+            <ac:spMk id="10" creationId="{7381E8DA-A0F8-1C69-49BF-53E276A94C09}"/>
           </ac:spMkLst>
         </pc:spChg>
       </pc:sldChg>
@@ -335,81 +366,9 @@
           <pc:docMk/>
           <pc:sldMk cId="3211769070" sldId="265"/>
         </pc:sldMkLst>
-        <pc:spChg chg="del">
-          <ac:chgData name="Vermeulen - van Gent, Sander" userId="e08259fd-81d2-4a86-9b20-28ba02d67a18" providerId="ADAL" clId="{B876D7DA-DFE9-446E-BF99-95F4DD9EE379}" dt="2025-04-17T09:26:41.908" v="138" actId="700"/>
-          <ac:spMkLst>
-            <pc:docMk/>
-            <pc:sldMk cId="3211769070" sldId="265"/>
-            <ac:spMk id="2" creationId="{F002FDAD-2C90-7F5B-0F2D-C8488C78BF32}"/>
-          </ac:spMkLst>
-        </pc:spChg>
-        <pc:spChg chg="del">
-          <ac:chgData name="Vermeulen - van Gent, Sander" userId="e08259fd-81d2-4a86-9b20-28ba02d67a18" providerId="ADAL" clId="{B876D7DA-DFE9-446E-BF99-95F4DD9EE379}" dt="2025-04-17T09:26:41.908" v="138" actId="700"/>
-          <ac:spMkLst>
-            <pc:docMk/>
-            <pc:sldMk cId="3211769070" sldId="265"/>
-            <ac:spMk id="3" creationId="{8E2E2B0C-5544-8D99-A58E-A85397595218}"/>
-          </ac:spMkLst>
-        </pc:spChg>
-        <pc:spChg chg="del">
-          <ac:chgData name="Vermeulen - van Gent, Sander" userId="e08259fd-81d2-4a86-9b20-28ba02d67a18" providerId="ADAL" clId="{B876D7DA-DFE9-446E-BF99-95F4DD9EE379}" dt="2025-04-17T09:26:41.908" v="138" actId="700"/>
-          <ac:spMkLst>
-            <pc:docMk/>
-            <pc:sldMk cId="3211769070" sldId="265"/>
-            <ac:spMk id="4" creationId="{39110194-B834-3B4C-83EE-2CAB98C0B582}"/>
-          </ac:spMkLst>
-        </pc:spChg>
-        <pc:spChg chg="del">
-          <ac:chgData name="Vermeulen - van Gent, Sander" userId="e08259fd-81d2-4a86-9b20-28ba02d67a18" providerId="ADAL" clId="{B876D7DA-DFE9-446E-BF99-95F4DD9EE379}" dt="2025-04-17T09:26:41.908" v="138" actId="700"/>
-          <ac:spMkLst>
-            <pc:docMk/>
-            <pc:sldMk cId="3211769070" sldId="265"/>
-            <ac:spMk id="5" creationId="{71EEF77A-DB04-EDAF-E3CF-702DBC49E1D6}"/>
-          </ac:spMkLst>
-        </pc:spChg>
-        <pc:spChg chg="add del mod">
-          <ac:chgData name="Vermeulen - van Gent, Sander" userId="e08259fd-81d2-4a86-9b20-28ba02d67a18" providerId="ADAL" clId="{B876D7DA-DFE9-446E-BF99-95F4DD9EE379}" dt="2025-04-17T09:27:09.900" v="141" actId="478"/>
-          <ac:spMkLst>
-            <pc:docMk/>
-            <pc:sldMk cId="3211769070" sldId="265"/>
-            <ac:spMk id="6" creationId="{D5706145-23FF-45BD-0502-2D0159326E95}"/>
-          </ac:spMkLst>
-        </pc:spChg>
-        <pc:spChg chg="add del mod">
-          <ac:chgData name="Vermeulen - van Gent, Sander" userId="e08259fd-81d2-4a86-9b20-28ba02d67a18" providerId="ADAL" clId="{B876D7DA-DFE9-446E-BF99-95F4DD9EE379}" dt="2025-04-17T09:27:09.900" v="141" actId="478"/>
-          <ac:spMkLst>
-            <pc:docMk/>
-            <pc:sldMk cId="3211769070" sldId="265"/>
-            <ac:spMk id="7" creationId="{70090F2D-6471-B696-014E-2301DE241151}"/>
-          </ac:spMkLst>
-        </pc:spChg>
-        <pc:spChg chg="add del mod">
-          <ac:chgData name="Vermeulen - van Gent, Sander" userId="e08259fd-81d2-4a86-9b20-28ba02d67a18" providerId="ADAL" clId="{B876D7DA-DFE9-446E-BF99-95F4DD9EE379}" dt="2025-04-17T09:27:09.900" v="141" actId="478"/>
-          <ac:spMkLst>
-            <pc:docMk/>
-            <pc:sldMk cId="3211769070" sldId="265"/>
-            <ac:spMk id="8" creationId="{B6239C86-4BC4-29AC-D225-858347F161D5}"/>
-          </ac:spMkLst>
-        </pc:spChg>
-        <pc:spChg chg="add del mod">
-          <ac:chgData name="Vermeulen - van Gent, Sander" userId="e08259fd-81d2-4a86-9b20-28ba02d67a18" providerId="ADAL" clId="{B876D7DA-DFE9-446E-BF99-95F4DD9EE379}" dt="2025-04-17T09:27:09.900" v="141" actId="478"/>
-          <ac:spMkLst>
-            <pc:docMk/>
-            <pc:sldMk cId="3211769070" sldId="265"/>
-            <ac:spMk id="9" creationId="{2E30B5F7-35E1-80B8-1C3E-D7CE5F8FC9AD}"/>
-          </ac:spMkLst>
-        </pc:spChg>
-        <pc:spChg chg="add del mod">
-          <ac:chgData name="Vermeulen - van Gent, Sander" userId="e08259fd-81d2-4a86-9b20-28ba02d67a18" providerId="ADAL" clId="{B876D7DA-DFE9-446E-BF99-95F4DD9EE379}" dt="2025-04-17T09:27:09.900" v="141" actId="478"/>
-          <ac:spMkLst>
-            <pc:docMk/>
-            <pc:sldMk cId="3211769070" sldId="265"/>
-            <ac:spMk id="10" creationId="{D58D8F3F-F136-4899-D09B-92E79EED7900}"/>
-          </ac:spMkLst>
-        </pc:spChg>
       </pc:sldChg>
       <pc:sldMasterChg chg="modSp mod addSldLayout delSldLayout modSldLayout sldLayoutOrd">
-        <pc:chgData name="Vermeulen - van Gent, Sander" userId="e08259fd-81d2-4a86-9b20-28ba02d67a18" providerId="ADAL" clId="{B876D7DA-DFE9-446E-BF99-95F4DD9EE379}" dt="2025-04-17T09:59:29.669" v="148" actId="20577"/>
+        <pc:chgData name="Vermeulen - van Gent, Sander" userId="e08259fd-81d2-4a86-9b20-28ba02d67a18" providerId="ADAL" clId="{B876D7DA-DFE9-446E-BF99-95F4DD9EE379}" dt="2025-04-30T10:59:21.168" v="212" actId="14430"/>
         <pc:sldMasterMkLst>
           <pc:docMk/>
           <pc:sldMasterMk cId="582609979" sldId="2147483648"/>
@@ -796,13 +755,22 @@
             </ac:spMkLst>
           </pc:spChg>
         </pc:sldLayoutChg>
-        <pc:sldLayoutChg chg="modSp mod">
-          <pc:chgData name="Vermeulen - van Gent, Sander" userId="e08259fd-81d2-4a86-9b20-28ba02d67a18" providerId="ADAL" clId="{B876D7DA-DFE9-446E-BF99-95F4DD9EE379}" dt="2025-04-09T09:47:40.585" v="11" actId="2711"/>
+        <pc:sldLayoutChg chg="addSp delSp modSp mod">
+          <pc:chgData name="Vermeulen - van Gent, Sander" userId="e08259fd-81d2-4a86-9b20-28ba02d67a18" providerId="ADAL" clId="{B876D7DA-DFE9-446E-BF99-95F4DD9EE379}" dt="2025-04-30T10:59:21.168" v="212" actId="14430"/>
           <pc:sldLayoutMkLst>
             <pc:docMk/>
             <pc:sldMasterMk cId="582609979" sldId="2147483648"/>
             <pc:sldLayoutMk cId="3849775906" sldId="2147483704"/>
           </pc:sldLayoutMkLst>
+          <pc:spChg chg="add del mod">
+            <ac:chgData name="Vermeulen - van Gent, Sander" userId="e08259fd-81d2-4a86-9b20-28ba02d67a18" providerId="ADAL" clId="{B876D7DA-DFE9-446E-BF99-95F4DD9EE379}" dt="2025-04-30T10:56:41.385" v="210" actId="478"/>
+            <ac:spMkLst>
+              <pc:docMk/>
+              <pc:sldMasterMk cId="582609979" sldId="2147483648"/>
+              <pc:sldLayoutMk cId="3849775906" sldId="2147483704"/>
+              <ac:spMk id="3" creationId="{C3B62D36-52EF-7312-D144-46274A55EF35}"/>
+            </ac:spMkLst>
+          </pc:spChg>
           <pc:spChg chg="mod">
             <ac:chgData name="Vermeulen - van Gent, Sander" userId="e08259fd-81d2-4a86-9b20-28ba02d67a18" providerId="ADAL" clId="{B876D7DA-DFE9-446E-BF99-95F4DD9EE379}" dt="2025-04-09T09:47:36.282" v="10" actId="2711"/>
             <ac:spMkLst>
@@ -813,7 +781,7 @@
             </ac:spMkLst>
           </pc:spChg>
           <pc:spChg chg="mod">
-            <ac:chgData name="Vermeulen - van Gent, Sander" userId="e08259fd-81d2-4a86-9b20-28ba02d67a18" providerId="ADAL" clId="{B876D7DA-DFE9-446E-BF99-95F4DD9EE379}" dt="2025-04-09T09:47:40.585" v="11" actId="2711"/>
+            <ac:chgData name="Vermeulen - van Gent, Sander" userId="e08259fd-81d2-4a86-9b20-28ba02d67a18" providerId="ADAL" clId="{B876D7DA-DFE9-446E-BF99-95F4DD9EE379}" dt="2025-04-30T09:59:10.443" v="192" actId="20577"/>
             <ac:spMkLst>
               <pc:docMk/>
               <pc:sldMasterMk cId="582609979" sldId="2147483648"/>
@@ -822,7 +790,7 @@
             </ac:spMkLst>
           </pc:spChg>
           <pc:spChg chg="mod">
-            <ac:chgData name="Vermeulen - van Gent, Sander" userId="e08259fd-81d2-4a86-9b20-28ba02d67a18" providerId="ADAL" clId="{B876D7DA-DFE9-446E-BF99-95F4DD9EE379}" dt="2025-04-09T09:47:36.282" v="10" actId="2711"/>
+            <ac:chgData name="Vermeulen - van Gent, Sander" userId="e08259fd-81d2-4a86-9b20-28ba02d67a18" providerId="ADAL" clId="{B876D7DA-DFE9-446E-BF99-95F4DD9EE379}" dt="2025-04-30T09:59:14.090" v="201" actId="20577"/>
             <ac:spMkLst>
               <pc:docMk/>
               <pc:sldMasterMk cId="582609979" sldId="2147483648"/>
@@ -830,8 +798,8 @@
               <ac:spMk id="13" creationId="{B5C74B2A-748B-0740-1934-6885F2B1E828}"/>
             </ac:spMkLst>
           </pc:spChg>
-          <pc:spChg chg="mod">
-            <ac:chgData name="Vermeulen - van Gent, Sander" userId="e08259fd-81d2-4a86-9b20-28ba02d67a18" providerId="ADAL" clId="{B876D7DA-DFE9-446E-BF99-95F4DD9EE379}" dt="2025-04-09T09:47:36.282" v="10" actId="2711"/>
+          <pc:spChg chg="del mod">
+            <ac:chgData name="Vermeulen - van Gent, Sander" userId="e08259fd-81d2-4a86-9b20-28ba02d67a18" providerId="ADAL" clId="{B876D7DA-DFE9-446E-BF99-95F4DD9EE379}" dt="2025-04-30T09:59:36.635" v="203" actId="478"/>
             <ac:spMkLst>
               <pc:docMk/>
               <pc:sldMasterMk cId="582609979" sldId="2147483648"/>
@@ -839,8 +807,8 @@
               <ac:spMk id="14" creationId="{5571B4FA-5AE5-9A9D-0255-A58C8CD0F28C}"/>
             </ac:spMkLst>
           </pc:spChg>
-          <pc:spChg chg="mod">
-            <ac:chgData name="Vermeulen - van Gent, Sander" userId="e08259fd-81d2-4a86-9b20-28ba02d67a18" providerId="ADAL" clId="{B876D7DA-DFE9-446E-BF99-95F4DD9EE379}" dt="2025-04-09T09:47:36.282" v="10" actId="2711"/>
+          <pc:spChg chg="del mod">
+            <ac:chgData name="Vermeulen - van Gent, Sander" userId="e08259fd-81d2-4a86-9b20-28ba02d67a18" providerId="ADAL" clId="{B876D7DA-DFE9-446E-BF99-95F4DD9EE379}" dt="2025-04-30T09:59:36.635" v="203" actId="478"/>
             <ac:spMkLst>
               <pc:docMk/>
               <pc:sldMasterMk cId="582609979" sldId="2147483648"/>
@@ -848,8 +816,8 @@
               <ac:spMk id="15" creationId="{C2E38561-545A-6019-51B5-5CBFC5E5C694}"/>
             </ac:spMkLst>
           </pc:spChg>
-          <pc:spChg chg="mod">
-            <ac:chgData name="Vermeulen - van Gent, Sander" userId="e08259fd-81d2-4a86-9b20-28ba02d67a18" providerId="ADAL" clId="{B876D7DA-DFE9-446E-BF99-95F4DD9EE379}" dt="2025-04-09T09:47:36.282" v="10" actId="2711"/>
+          <pc:spChg chg="del mod">
+            <ac:chgData name="Vermeulen - van Gent, Sander" userId="e08259fd-81d2-4a86-9b20-28ba02d67a18" providerId="ADAL" clId="{B876D7DA-DFE9-446E-BF99-95F4DD9EE379}" dt="2025-04-30T09:59:36.635" v="203" actId="478"/>
             <ac:spMkLst>
               <pc:docMk/>
               <pc:sldMasterMk cId="582609979" sldId="2147483648"/>
@@ -858,7 +826,7 @@
             </ac:spMkLst>
           </pc:spChg>
           <pc:spChg chg="mod">
-            <ac:chgData name="Vermeulen - van Gent, Sander" userId="e08259fd-81d2-4a86-9b20-28ba02d67a18" providerId="ADAL" clId="{B876D7DA-DFE9-446E-BF99-95F4DD9EE379}" dt="2025-04-09T09:47:36.282" v="10" actId="2711"/>
+            <ac:chgData name="Vermeulen - van Gent, Sander" userId="e08259fd-81d2-4a86-9b20-28ba02d67a18" providerId="ADAL" clId="{B876D7DA-DFE9-446E-BF99-95F4DD9EE379}" dt="2025-04-30T10:56:38.630" v="209" actId="14100"/>
             <ac:spMkLst>
               <pc:docMk/>
               <pc:sldMasterMk cId="582609979" sldId="2147483648"/>
@@ -866,8 +834,8 @@
               <ac:spMk id="17" creationId="{3D7EF6FF-2FDF-DFF5-CEBD-A0147DE93889}"/>
             </ac:spMkLst>
           </pc:spChg>
-          <pc:cxnChg chg="mod">
-            <ac:chgData name="Vermeulen - van Gent, Sander" userId="e08259fd-81d2-4a86-9b20-28ba02d67a18" providerId="ADAL" clId="{B876D7DA-DFE9-446E-BF99-95F4DD9EE379}" dt="2025-04-09T09:47:36.282" v="10" actId="2711"/>
+          <pc:cxnChg chg="mod modVis">
+            <ac:chgData name="Vermeulen - van Gent, Sander" userId="e08259fd-81d2-4a86-9b20-28ba02d67a18" providerId="ADAL" clId="{B876D7DA-DFE9-446E-BF99-95F4DD9EE379}" dt="2025-04-30T10:59:21.168" v="212" actId="14430"/>
             <ac:cxnSpMkLst>
               <pc:docMk/>
               <pc:sldMasterMk cId="582609979" sldId="2147483648"/>
@@ -884,8 +852,8 @@
               <ac:cxnSpMk id="5" creationId="{024B5762-4C9B-2E1A-D584-EA7C43CAD9B0}"/>
             </ac:cxnSpMkLst>
           </pc:cxnChg>
-          <pc:cxnChg chg="mod">
-            <ac:chgData name="Vermeulen - van Gent, Sander" userId="e08259fd-81d2-4a86-9b20-28ba02d67a18" providerId="ADAL" clId="{B876D7DA-DFE9-446E-BF99-95F4DD9EE379}" dt="2025-04-09T09:47:36.282" v="10" actId="2711"/>
+          <pc:cxnChg chg="del mod">
+            <ac:chgData name="Vermeulen - van Gent, Sander" userId="e08259fd-81d2-4a86-9b20-28ba02d67a18" providerId="ADAL" clId="{B876D7DA-DFE9-446E-BF99-95F4DD9EE379}" dt="2025-04-30T10:56:43.954" v="211" actId="478"/>
             <ac:cxnSpMkLst>
               <pc:docMk/>
               <pc:sldMasterMk cId="582609979" sldId="2147483648"/>
@@ -1203,6 +1171,41 @@
             </ac:spMkLst>
           </pc:spChg>
         </pc:sldLayoutChg>
+        <pc:sldLayoutChg chg="delSp modSp mod">
+          <pc:chgData name="Vermeulen - van Gent, Sander" userId="e08259fd-81d2-4a86-9b20-28ba02d67a18" providerId="ADAL" clId="{B876D7DA-DFE9-446E-BF99-95F4DD9EE379}" dt="2025-04-24T08:50:11.284" v="160" actId="962"/>
+          <pc:sldLayoutMkLst>
+            <pc:docMk/>
+            <pc:sldMasterMk cId="582609979" sldId="2147483648"/>
+            <pc:sldLayoutMk cId="2726465838" sldId="2147483709"/>
+          </pc:sldLayoutMkLst>
+          <pc:spChg chg="mod">
+            <ac:chgData name="Vermeulen - van Gent, Sander" userId="e08259fd-81d2-4a86-9b20-28ba02d67a18" providerId="ADAL" clId="{B876D7DA-DFE9-446E-BF99-95F4DD9EE379}" dt="2025-04-24T08:49:50.721" v="155" actId="20577"/>
+            <ac:spMkLst>
+              <pc:docMk/>
+              <pc:sldMasterMk cId="582609979" sldId="2147483648"/>
+              <pc:sldLayoutMk cId="2726465838" sldId="2147483709"/>
+              <ac:spMk id="11" creationId="{25BB0762-1AD0-F5A1-E01E-F53682EB8F5D}"/>
+            </ac:spMkLst>
+          </pc:spChg>
+          <pc:spChg chg="mod">
+            <ac:chgData name="Vermeulen - van Gent, Sander" userId="e08259fd-81d2-4a86-9b20-28ba02d67a18" providerId="ADAL" clId="{B876D7DA-DFE9-446E-BF99-95F4DD9EE379}" dt="2025-04-24T08:49:54.233" v="156"/>
+            <ac:spMkLst>
+              <pc:docMk/>
+              <pc:sldMasterMk cId="582609979" sldId="2147483648"/>
+              <pc:sldLayoutMk cId="2726465838" sldId="2147483709"/>
+              <ac:spMk id="13" creationId="{B5C74B2A-748B-0740-1934-6885F2B1E828}"/>
+            </ac:spMkLst>
+          </pc:spChg>
+          <pc:spChg chg="mod">
+            <ac:chgData name="Vermeulen - van Gent, Sander" userId="e08259fd-81d2-4a86-9b20-28ba02d67a18" providerId="ADAL" clId="{B876D7DA-DFE9-446E-BF99-95F4DD9EE379}" dt="2025-04-24T08:50:11.284" v="160" actId="962"/>
+            <ac:spMkLst>
+              <pc:docMk/>
+              <pc:sldMasterMk cId="582609979" sldId="2147483648"/>
+              <pc:sldLayoutMk cId="2726465838" sldId="2147483709"/>
+              <ac:spMk id="17" creationId="{33EB2F31-A51E-D3F5-6CA3-3AC4B7CB1972}"/>
+            </ac:spMkLst>
+          </pc:spChg>
+        </pc:sldLayoutChg>
       </pc:sldMasterChg>
     </pc:docChg>
   </pc:docChgLst>
@@ -1303,7 +1306,7 @@
           <a:p>
             <a:fld id="{BBEDBBAB-6028-4680-9556-A8238B314949}" type="datetimeFigureOut">
               <a:rPr lang="nl-NL" smtClean="0"/>
-              <a:t>17-4-2025</a:t>
+              <a:t>30-4-2025</a:t>
             </a:fld>
             <a:endParaRPr lang="nl-NL"/>
           </a:p>
@@ -1479,7 +1482,7 @@
           </a:lstStyle>
           <a:p>
             <a:fld id="{37F81271-B6F7-4A7E-8F6C-1E1DF4AA2733}" type="datetimeFigureOut">
-              <a:t>17-4-2025</a:t>
+              <a:t>30-4-2025</a:t>
             </a:fld>
             <a:endParaRPr lang="nl-NL"/>
           </a:p>
@@ -2617,7 +2620,1381 @@
 </p:sldLayout>
 </file>
 
+<file path=ppt/slideLayouts/slideLayout10.xml><?xml version="1.0" encoding="utf-8"?>
+<p:sldLayout xmlns:a="http://schemas.openxmlformats.org/drawingml/2006/main" xmlns:r="http://schemas.openxmlformats.org/officeDocument/2006/relationships" xmlns:p="http://schemas.openxmlformats.org/presentationml/2006/main" preserve="1" userDrawn="1">
+  <p:cSld name="Rekenhulp">
+    <p:spTree>
+      <p:nvGrpSpPr>
+        <p:cNvPr id="1" name=""/>
+        <p:cNvGrpSpPr/>
+        <p:nvPr/>
+      </p:nvGrpSpPr>
+      <p:grpSpPr>
+        <a:xfrm>
+          <a:off x="0" y="0"/>
+          <a:ext cx="0" cy="0"/>
+          <a:chOff x="0" y="0"/>
+          <a:chExt cx="0" cy="0"/>
+        </a:xfrm>
+      </p:grpSpPr>
+      <p:cxnSp>
+        <p:nvCxnSpPr>
+          <p:cNvPr id="2" name="Rechter scheidingslijn" hidden="1">
+            <a:extLst>
+              <a:ext uri="{FF2B5EF4-FFF2-40B4-BE49-F238E27FC236}">
+                <a16:creationId xmlns:a16="http://schemas.microsoft.com/office/drawing/2014/main" id="{4F24702C-E64E-2547-EF7A-D18982DAC4CD}"/>
+              </a:ext>
+            </a:extLst>
+          </p:cNvPr>
+          <p:cNvCxnSpPr>
+            <a:cxnSpLocks/>
+          </p:cNvCxnSpPr>
+          <p:nvPr userDrawn="1"/>
+        </p:nvCxnSpPr>
+        <p:spPr>
+          <a:xfrm flipV="1">
+            <a:off x="8051825" y="1519200"/>
+            <a:ext cx="0" cy="4881600"/>
+          </a:xfrm>
+          <a:prstGeom prst="line">
+            <a:avLst/>
+          </a:prstGeom>
+          <a:ln w="12700">
+            <a:solidFill>
+              <a:schemeClr val="tx2">
+                <a:lumMod val="20000"/>
+                <a:lumOff val="80000"/>
+              </a:schemeClr>
+            </a:solidFill>
+          </a:ln>
+        </p:spPr>
+        <p:style>
+          <a:lnRef idx="1">
+            <a:schemeClr val="accent1"/>
+          </a:lnRef>
+          <a:fillRef idx="0">
+            <a:schemeClr val="accent1"/>
+          </a:fillRef>
+          <a:effectRef idx="0">
+            <a:schemeClr val="accent1"/>
+          </a:effectRef>
+          <a:fontRef idx="minor">
+            <a:schemeClr val="tx1"/>
+          </a:fontRef>
+        </p:style>
+      </p:cxnSp>
+      <p:cxnSp>
+        <p:nvCxnSpPr>
+          <p:cNvPr id="5" name="Linker scheidingslijn">
+            <a:extLst>
+              <a:ext uri="{FF2B5EF4-FFF2-40B4-BE49-F238E27FC236}">
+                <a16:creationId xmlns:a16="http://schemas.microsoft.com/office/drawing/2014/main" id="{024B5762-4C9B-2E1A-D584-EA7C43CAD9B0}"/>
+              </a:ext>
+            </a:extLst>
+          </p:cNvPr>
+          <p:cNvCxnSpPr>
+            <a:cxnSpLocks/>
+          </p:cNvCxnSpPr>
+          <p:nvPr userDrawn="1"/>
+        </p:nvCxnSpPr>
+        <p:spPr>
+          <a:xfrm flipV="1">
+            <a:off x="4140175" y="1519200"/>
+            <a:ext cx="0" cy="4881600"/>
+          </a:xfrm>
+          <a:prstGeom prst="line">
+            <a:avLst/>
+          </a:prstGeom>
+          <a:ln w="12700">
+            <a:solidFill>
+              <a:schemeClr val="tx2">
+                <a:lumMod val="20000"/>
+                <a:lumOff val="80000"/>
+              </a:schemeClr>
+            </a:solidFill>
+          </a:ln>
+        </p:spPr>
+        <p:style>
+          <a:lnRef idx="1">
+            <a:schemeClr val="accent1"/>
+          </a:lnRef>
+          <a:fillRef idx="0">
+            <a:schemeClr val="accent1"/>
+          </a:fillRef>
+          <a:effectRef idx="0">
+            <a:schemeClr val="accent1"/>
+          </a:effectRef>
+          <a:fontRef idx="minor">
+            <a:schemeClr val="tx1"/>
+          </a:fontRef>
+        </p:style>
+      </p:cxnSp>
+      <p:sp>
+        <p:nvSpPr>
+          <p:cNvPr id="6" name="Rechtervlak" hidden="1">
+            <a:extLst>
+              <a:ext uri="{FF2B5EF4-FFF2-40B4-BE49-F238E27FC236}">
+                <a16:creationId xmlns:a16="http://schemas.microsoft.com/office/drawing/2014/main" id="{C48817EE-9108-2543-1BCB-27B17B31E919}"/>
+              </a:ext>
+            </a:extLst>
+          </p:cNvPr>
+          <p:cNvSpPr/>
+          <p:nvPr userDrawn="1"/>
+        </p:nvSpPr>
+        <p:spPr>
+          <a:xfrm>
+            <a:off x="8280408" y="1520170"/>
+            <a:ext cx="3454375" cy="4880630"/>
+          </a:xfrm>
+          <a:prstGeom prst="rect">
+            <a:avLst/>
+          </a:prstGeom>
+          <a:solidFill>
+            <a:schemeClr val="bg1">
+              <a:lumMod val="95000"/>
+            </a:schemeClr>
+          </a:solidFill>
+          <a:ln>
+            <a:noFill/>
+          </a:ln>
+        </p:spPr>
+        <p:style>
+          <a:lnRef idx="2">
+            <a:schemeClr val="accent1">
+              <a:shade val="15000"/>
+            </a:schemeClr>
+          </a:lnRef>
+          <a:fillRef idx="1">
+            <a:schemeClr val="accent1"/>
+          </a:fillRef>
+          <a:effectRef idx="0">
+            <a:schemeClr val="accent1"/>
+          </a:effectRef>
+          <a:fontRef idx="minor">
+            <a:schemeClr val="lt1"/>
+          </a:fontRef>
+        </p:style>
+        <p:txBody>
+          <a:bodyPr rtlCol="0" anchor="ctr"/>
+          <a:lstStyle/>
+          <a:p>
+            <a:pPr algn="ctr"/>
+            <a:endParaRPr lang="nl-NL" sz="3124"/>
+          </a:p>
+        </p:txBody>
+      </p:sp>
+      <p:sp>
+        <p:nvSpPr>
+          <p:cNvPr id="7" name="Middenvlak" hidden="1">
+            <a:extLst>
+              <a:ext uri="{FF2B5EF4-FFF2-40B4-BE49-F238E27FC236}">
+                <a16:creationId xmlns:a16="http://schemas.microsoft.com/office/drawing/2014/main" id="{E136F790-08A3-3874-D920-266B03612B9F}"/>
+              </a:ext>
+            </a:extLst>
+          </p:cNvPr>
+          <p:cNvSpPr/>
+          <p:nvPr userDrawn="1"/>
+        </p:nvSpPr>
+        <p:spPr>
+          <a:xfrm>
+            <a:off x="4368869" y="1519200"/>
+            <a:ext cx="3454375" cy="4880630"/>
+          </a:xfrm>
+          <a:prstGeom prst="rect">
+            <a:avLst/>
+          </a:prstGeom>
+          <a:solidFill>
+            <a:schemeClr val="bg1">
+              <a:lumMod val="95000"/>
+            </a:schemeClr>
+          </a:solidFill>
+          <a:ln>
+            <a:noFill/>
+          </a:ln>
+        </p:spPr>
+        <p:style>
+          <a:lnRef idx="2">
+            <a:schemeClr val="accent1">
+              <a:shade val="15000"/>
+            </a:schemeClr>
+          </a:lnRef>
+          <a:fillRef idx="1">
+            <a:schemeClr val="accent1"/>
+          </a:fillRef>
+          <a:effectRef idx="0">
+            <a:schemeClr val="accent1"/>
+          </a:effectRef>
+          <a:fontRef idx="minor">
+            <a:schemeClr val="lt1"/>
+          </a:fontRef>
+        </p:style>
+        <p:txBody>
+          <a:bodyPr rtlCol="0" anchor="ctr"/>
+          <a:lstStyle/>
+          <a:p>
+            <a:pPr algn="ctr"/>
+            <a:endParaRPr lang="nl-NL" sz="3124"/>
+          </a:p>
+        </p:txBody>
+      </p:sp>
+      <p:sp>
+        <p:nvSpPr>
+          <p:cNvPr id="8" name="Linkervlak" hidden="1">
+            <a:extLst>
+              <a:ext uri="{FF2B5EF4-FFF2-40B4-BE49-F238E27FC236}">
+                <a16:creationId xmlns:a16="http://schemas.microsoft.com/office/drawing/2014/main" id="{D6EE9A9C-0C94-24AE-98D4-30E97FD9D95E}"/>
+              </a:ext>
+            </a:extLst>
+          </p:cNvPr>
+          <p:cNvSpPr/>
+          <p:nvPr userDrawn="1"/>
+        </p:nvSpPr>
+        <p:spPr>
+          <a:xfrm>
+            <a:off x="457220" y="1520170"/>
+            <a:ext cx="3454375" cy="4880630"/>
+          </a:xfrm>
+          <a:prstGeom prst="rect">
+            <a:avLst/>
+          </a:prstGeom>
+          <a:solidFill>
+            <a:schemeClr val="bg1">
+              <a:lumMod val="95000"/>
+            </a:schemeClr>
+          </a:solidFill>
+          <a:ln>
+            <a:noFill/>
+          </a:ln>
+        </p:spPr>
+        <p:style>
+          <a:lnRef idx="2">
+            <a:schemeClr val="accent1">
+              <a:shade val="15000"/>
+            </a:schemeClr>
+          </a:lnRef>
+          <a:fillRef idx="1">
+            <a:schemeClr val="accent1"/>
+          </a:fillRef>
+          <a:effectRef idx="0">
+            <a:schemeClr val="accent1"/>
+          </a:effectRef>
+          <a:fontRef idx="minor">
+            <a:schemeClr val="lt1"/>
+          </a:fontRef>
+        </p:style>
+        <p:txBody>
+          <a:bodyPr rtlCol="0" anchor="ctr"/>
+          <a:lstStyle/>
+          <a:p>
+            <a:pPr algn="ctr"/>
+            <a:endParaRPr lang="nl-NL" sz="3124"/>
+          </a:p>
+        </p:txBody>
+      </p:sp>
+      <p:sp>
+        <p:nvSpPr>
+          <p:cNvPr id="10" name="Driehoek">
+            <a:extLst>
+              <a:ext uri="{FF2B5EF4-FFF2-40B4-BE49-F238E27FC236}">
+                <a16:creationId xmlns:a16="http://schemas.microsoft.com/office/drawing/2014/main" id="{D382B982-138B-EF5F-A4A3-F952DD1C516E}"/>
+              </a:ext>
+            </a:extLst>
+          </p:cNvPr>
+          <p:cNvSpPr/>
+          <p:nvPr userDrawn="1"/>
+        </p:nvSpPr>
+        <p:spPr>
+          <a:xfrm rot="10800000" flipH="1">
+            <a:off x="9719594" y="0"/>
+            <a:ext cx="576000" cy="1066800"/>
+          </a:xfrm>
+          <a:prstGeom prst="rtTriangle">
+            <a:avLst/>
+          </a:prstGeom>
+          <a:solidFill>
+            <a:schemeClr val="accent1"/>
+          </a:solidFill>
+          <a:ln>
+            <a:noFill/>
+          </a:ln>
+        </p:spPr>
+        <p:style>
+          <a:lnRef idx="2">
+            <a:schemeClr val="accent1">
+              <a:shade val="50000"/>
+            </a:schemeClr>
+          </a:lnRef>
+          <a:fillRef idx="1">
+            <a:schemeClr val="accent1"/>
+          </a:fillRef>
+          <a:effectRef idx="0">
+            <a:schemeClr val="accent1"/>
+          </a:effectRef>
+          <a:fontRef idx="minor">
+            <a:schemeClr val="lt1"/>
+          </a:fontRef>
+        </p:style>
+        <p:txBody>
+          <a:bodyPr rtlCol="0" anchor="ctr"/>
+          <a:lstStyle/>
+          <a:p>
+            <a:pPr algn="l"/>
+            <a:endParaRPr lang="en-US" sz="2391" b="1">
+              <a:latin typeface="+mn-lt"/>
+            </a:endParaRPr>
+          </a:p>
+        </p:txBody>
+      </p:sp>
+      <p:sp>
+        <p:nvSpPr>
+          <p:cNvPr id="11" name="Titelblok">
+            <a:extLst>
+              <a:ext uri="{FF2B5EF4-FFF2-40B4-BE49-F238E27FC236}">
+                <a16:creationId xmlns:a16="http://schemas.microsoft.com/office/drawing/2014/main" id="{25BB0762-1AD0-F5A1-E01E-F53682EB8F5D}"/>
+              </a:ext>
+            </a:extLst>
+          </p:cNvPr>
+          <p:cNvSpPr/>
+          <p:nvPr userDrawn="1"/>
+        </p:nvSpPr>
+        <p:spPr>
+          <a:xfrm>
+            <a:off x="1" y="0"/>
+            <a:ext cx="9719589" cy="1066800"/>
+          </a:xfrm>
+          <a:prstGeom prst="rect">
+            <a:avLst/>
+          </a:prstGeom>
+          <a:solidFill>
+            <a:schemeClr val="accent1"/>
+          </a:solidFill>
+          <a:ln>
+            <a:noFill/>
+          </a:ln>
+        </p:spPr>
+        <p:style>
+          <a:lnRef idx="2">
+            <a:schemeClr val="accent1">
+              <a:shade val="50000"/>
+            </a:schemeClr>
+          </a:lnRef>
+          <a:fillRef idx="1">
+            <a:schemeClr val="accent1"/>
+          </a:fillRef>
+          <a:effectRef idx="0">
+            <a:schemeClr val="accent1"/>
+          </a:effectRef>
+          <a:fontRef idx="minor">
+            <a:schemeClr val="lt1"/>
+          </a:fontRef>
+        </p:style>
+        <p:txBody>
+          <a:bodyPr rtlCol="0" anchor="ctr"/>
+          <a:lstStyle/>
+          <a:p>
+            <a:pPr marL="0" indent="360388" algn="l"/>
+            <a:r>
+              <a:rPr lang="nl-NL" sz="2400" b="1" noProof="0" dirty="0">
+                <a:latin typeface="+mj-lt"/>
+              </a:rPr>
+              <a:t>Rekenhulp</a:t>
+            </a:r>
+          </a:p>
+        </p:txBody>
+      </p:sp>
+      <p:sp>
+        <p:nvSpPr>
+          <p:cNvPr id="13" name="Tekstvak">
+            <a:extLst>
+              <a:ext uri="{FF2B5EF4-FFF2-40B4-BE49-F238E27FC236}">
+                <a16:creationId xmlns:a16="http://schemas.microsoft.com/office/drawing/2014/main" id="{B5C74B2A-748B-0740-1934-6885F2B1E828}"/>
+              </a:ext>
+            </a:extLst>
+          </p:cNvPr>
+          <p:cNvSpPr txBox="1"/>
+          <p:nvPr userDrawn="1"/>
+        </p:nvSpPr>
+        <p:spPr>
+          <a:xfrm>
+            <a:off x="457218" y="1519201"/>
+            <a:ext cx="3456000" cy="577081"/>
+          </a:xfrm>
+          <a:prstGeom prst="rect">
+            <a:avLst/>
+          </a:prstGeom>
+          <a:noFill/>
+        </p:spPr>
+        <p:txBody>
+          <a:bodyPr rot="0" spcFirstLastPara="0" vert="horz" wrap="square" lIns="91440" tIns="45720" rIns="91440" bIns="45720" numCol="1" spcCol="0" rtlCol="0" fromWordArt="0" anchor="t" anchorCtr="0" forceAA="0" compatLnSpc="1">
+            <a:prstTxWarp prst="textNoShape">
+              <a:avLst/>
+            </a:prstTxWarp>
+            <a:spAutoFit/>
+          </a:bodyPr>
+          <a:lstStyle>
+            <a:defPPr>
+              <a:defRPr lang="nl-NL"/>
+            </a:defPPr>
+            <a:lvl1pPr marL="0" algn="l" defTabSz="839852" rtl="0" eaLnBrk="1" latinLnBrk="0" hangingPunct="1">
+              <a:defRPr sz="1653" kern="1200">
+                <a:solidFill>
+                  <a:schemeClr val="tx1"/>
+                </a:solidFill>
+                <a:latin typeface="+mn-lt"/>
+                <a:ea typeface="+mn-ea"/>
+                <a:cs typeface="+mn-cs"/>
+              </a:defRPr>
+            </a:lvl1pPr>
+            <a:lvl2pPr marL="419926" algn="l" defTabSz="839852" rtl="0" eaLnBrk="1" latinLnBrk="0" hangingPunct="1">
+              <a:defRPr sz="1653" kern="1200">
+                <a:solidFill>
+                  <a:schemeClr val="tx1"/>
+                </a:solidFill>
+                <a:latin typeface="+mn-lt"/>
+                <a:ea typeface="+mn-ea"/>
+                <a:cs typeface="+mn-cs"/>
+              </a:defRPr>
+            </a:lvl2pPr>
+            <a:lvl3pPr marL="839852" algn="l" defTabSz="839852" rtl="0" eaLnBrk="1" latinLnBrk="0" hangingPunct="1">
+              <a:defRPr sz="1653" kern="1200">
+                <a:solidFill>
+                  <a:schemeClr val="tx1"/>
+                </a:solidFill>
+                <a:latin typeface="+mn-lt"/>
+                <a:ea typeface="+mn-ea"/>
+                <a:cs typeface="+mn-cs"/>
+              </a:defRPr>
+            </a:lvl3pPr>
+            <a:lvl4pPr marL="1259779" algn="l" defTabSz="839852" rtl="0" eaLnBrk="1" latinLnBrk="0" hangingPunct="1">
+              <a:defRPr sz="1653" kern="1200">
+                <a:solidFill>
+                  <a:schemeClr val="tx1"/>
+                </a:solidFill>
+                <a:latin typeface="+mn-lt"/>
+                <a:ea typeface="+mn-ea"/>
+                <a:cs typeface="+mn-cs"/>
+              </a:defRPr>
+            </a:lvl4pPr>
+            <a:lvl5pPr marL="1679704" algn="l" defTabSz="839852" rtl="0" eaLnBrk="1" latinLnBrk="0" hangingPunct="1">
+              <a:defRPr sz="1653" kern="1200">
+                <a:solidFill>
+                  <a:schemeClr val="tx1"/>
+                </a:solidFill>
+                <a:latin typeface="+mn-lt"/>
+                <a:ea typeface="+mn-ea"/>
+                <a:cs typeface="+mn-cs"/>
+              </a:defRPr>
+            </a:lvl5pPr>
+            <a:lvl6pPr marL="2099630" algn="l" defTabSz="839852" rtl="0" eaLnBrk="1" latinLnBrk="0" hangingPunct="1">
+              <a:defRPr sz="1653" kern="1200">
+                <a:solidFill>
+                  <a:schemeClr val="tx1"/>
+                </a:solidFill>
+                <a:latin typeface="+mn-lt"/>
+                <a:ea typeface="+mn-ea"/>
+                <a:cs typeface="+mn-cs"/>
+              </a:defRPr>
+            </a:lvl6pPr>
+            <a:lvl7pPr marL="2519556" algn="l" defTabSz="839852" rtl="0" eaLnBrk="1" latinLnBrk="0" hangingPunct="1">
+              <a:defRPr sz="1653" kern="1200">
+                <a:solidFill>
+                  <a:schemeClr val="tx1"/>
+                </a:solidFill>
+                <a:latin typeface="+mn-lt"/>
+                <a:ea typeface="+mn-ea"/>
+                <a:cs typeface="+mn-cs"/>
+              </a:defRPr>
+            </a:lvl7pPr>
+            <a:lvl8pPr marL="2939482" algn="l" defTabSz="839852" rtl="0" eaLnBrk="1" latinLnBrk="0" hangingPunct="1">
+              <a:defRPr sz="1653" kern="1200">
+                <a:solidFill>
+                  <a:schemeClr val="tx1"/>
+                </a:solidFill>
+                <a:latin typeface="+mn-lt"/>
+                <a:ea typeface="+mn-ea"/>
+                <a:cs typeface="+mn-cs"/>
+              </a:defRPr>
+            </a:lvl8pPr>
+            <a:lvl9pPr marL="3359408" algn="l" defTabSz="839852" rtl="0" eaLnBrk="1" latinLnBrk="0" hangingPunct="1">
+              <a:defRPr sz="1653" kern="1200">
+                <a:solidFill>
+                  <a:schemeClr val="tx1"/>
+                </a:solidFill>
+                <a:latin typeface="+mn-lt"/>
+                <a:ea typeface="+mn-ea"/>
+                <a:cs typeface="+mn-cs"/>
+              </a:defRPr>
+            </a:lvl9pPr>
+          </a:lstStyle>
+          <a:p>
+            <a:pPr marL="0" marR="0" lvl="0" indent="0" algn="l" defTabSz="839909" rtl="0" eaLnBrk="1" fontAlgn="auto" latinLnBrk="0" hangingPunct="1">
+              <a:lnSpc>
+                <a:spcPct val="100000"/>
+              </a:lnSpc>
+              <a:spcBef>
+                <a:spcPts val="0"/>
+              </a:spcBef>
+              <a:spcAft>
+                <a:spcPts val="0"/>
+              </a:spcAft>
+              <a:buClrTx/>
+              <a:buSzTx/>
+              <a:buFontTx/>
+              <a:buNone/>
+              <a:tabLst/>
+              <a:defRPr/>
+            </a:pPr>
+            <a:r>
+              <a:rPr lang="nl-NL" sz="1050" b="1" noProof="0" dirty="0">
+                <a:latin typeface="+mj-lt"/>
+              </a:rPr>
+              <a:t>Rekenhulp</a:t>
+            </a:r>
+            <a:endParaRPr lang="nl-NL" sz="1050" b="1" kern="1200" dirty="0">
+              <a:solidFill>
+                <a:schemeClr val="tx1"/>
+              </a:solidFill>
+              <a:latin typeface="+mn-lt"/>
+              <a:ea typeface="+mn-ea"/>
+              <a:cs typeface="+mn-cs"/>
+            </a:endParaRPr>
+          </a:p>
+          <a:p>
+            <a:pPr marL="0" marR="0" lvl="0" indent="0" algn="l" defTabSz="839909" rtl="0" eaLnBrk="1" fontAlgn="auto" latinLnBrk="0" hangingPunct="1">
+              <a:lnSpc>
+                <a:spcPct val="100000"/>
+              </a:lnSpc>
+              <a:spcBef>
+                <a:spcPts val="0"/>
+              </a:spcBef>
+              <a:spcAft>
+                <a:spcPts val="0"/>
+              </a:spcAft>
+              <a:buClrTx/>
+              <a:buSzTx/>
+              <a:buFontTx/>
+              <a:buNone/>
+              <a:tabLst/>
+              <a:defRPr/>
+            </a:pPr>
+            <a:endParaRPr lang="nl-NL" sz="1050" b="1" kern="1200" dirty="0">
+              <a:solidFill>
+                <a:schemeClr val="tx1"/>
+              </a:solidFill>
+              <a:latin typeface="+mn-lt"/>
+              <a:ea typeface="+mn-ea"/>
+              <a:cs typeface="+mn-cs"/>
+            </a:endParaRPr>
+          </a:p>
+          <a:p>
+            <a:pPr marL="0" marR="0" lvl="0" indent="0" algn="l" defTabSz="839909" rtl="0" eaLnBrk="1" fontAlgn="auto" latinLnBrk="0" hangingPunct="1">
+              <a:lnSpc>
+                <a:spcPct val="100000"/>
+              </a:lnSpc>
+              <a:spcBef>
+                <a:spcPts val="0"/>
+              </a:spcBef>
+              <a:spcAft>
+                <a:spcPts val="0"/>
+              </a:spcAft>
+              <a:buClrTx/>
+              <a:buSzTx/>
+              <a:buFontTx/>
+              <a:buNone/>
+              <a:tabLst/>
+              <a:defRPr/>
+            </a:pPr>
+            <a:r>
+              <a:rPr lang="nl-NL" sz="1050" b="0" kern="1200" dirty="0">
+                <a:solidFill>
+                  <a:schemeClr val="tx1"/>
+                </a:solidFill>
+                <a:latin typeface="+mn-lt"/>
+                <a:ea typeface="+mn-ea"/>
+                <a:cs typeface="+mn-cs"/>
+              </a:rPr>
+              <a:t>Tekst.</a:t>
+            </a:r>
+          </a:p>
+        </p:txBody>
+      </p:sp>
+      <p:cxnSp>
+        <p:nvCxnSpPr>
+          <p:cNvPr id="21" name="Linker scheidingslijn">
+            <a:extLst>
+              <a:ext uri="{FF2B5EF4-FFF2-40B4-BE49-F238E27FC236}">
+                <a16:creationId xmlns:a16="http://schemas.microsoft.com/office/drawing/2014/main" id="{875B34E6-233B-E234-77F0-CA5380CB8849}"/>
+              </a:ext>
+            </a:extLst>
+          </p:cNvPr>
+          <p:cNvCxnSpPr>
+            <a:cxnSpLocks/>
+          </p:cNvCxnSpPr>
+          <p:nvPr userDrawn="1"/>
+        </p:nvCxnSpPr>
+        <p:spPr>
+          <a:xfrm flipV="1">
+            <a:off x="4140175" y="1519200"/>
+            <a:ext cx="0" cy="4881600"/>
+          </a:xfrm>
+          <a:prstGeom prst="line">
+            <a:avLst/>
+          </a:prstGeom>
+          <a:ln w="12700">
+            <a:solidFill>
+              <a:schemeClr val="tx2">
+                <a:lumMod val="20000"/>
+                <a:lumOff val="80000"/>
+              </a:schemeClr>
+            </a:solidFill>
+          </a:ln>
+        </p:spPr>
+        <p:style>
+          <a:lnRef idx="1">
+            <a:schemeClr val="accent1"/>
+          </a:lnRef>
+          <a:fillRef idx="0">
+            <a:schemeClr val="accent1"/>
+          </a:fillRef>
+          <a:effectRef idx="0">
+            <a:schemeClr val="accent1"/>
+          </a:effectRef>
+          <a:fontRef idx="minor">
+            <a:schemeClr val="tx1"/>
+          </a:fontRef>
+        </p:style>
+      </p:cxnSp>
+      <p:sp>
+        <p:nvSpPr>
+          <p:cNvPr id="17" name="Rekenhulp 1">
+            <a:extLst>
+              <a:ext uri="{FF2B5EF4-FFF2-40B4-BE49-F238E27FC236}">
+                <a16:creationId xmlns:a16="http://schemas.microsoft.com/office/drawing/2014/main" id="{3D7EF6FF-2FDF-DFF5-CEBD-A0147DE93889}"/>
+              </a:ext>
+            </a:extLst>
+          </p:cNvPr>
+          <p:cNvSpPr>
+            <a:spLocks noGrp="1"/>
+          </p:cNvSpPr>
+          <p:nvPr>
+            <p:ph type="chart" sz="quarter" idx="14"/>
+          </p:nvPr>
+        </p:nvSpPr>
+        <p:spPr>
+          <a:xfrm>
+            <a:off x="4368812" y="1519200"/>
+            <a:ext cx="7365851" cy="2376000"/>
+          </a:xfrm>
+          <a:prstGeom prst="rect">
+            <a:avLst/>
+          </a:prstGeom>
+        </p:spPr>
+        <p:txBody>
+          <a:bodyPr/>
+          <a:lstStyle>
+            <a:lvl1pPr marL="0" indent="0">
+              <a:buNone/>
+              <a:defRPr>
+                <a:latin typeface="+mn-lt"/>
+              </a:defRPr>
+            </a:lvl1pPr>
+          </a:lstStyle>
+          <a:p>
+            <a:endParaRPr lang="nl-NL" dirty="0"/>
+          </a:p>
+        </p:txBody>
+      </p:sp>
+    </p:spTree>
+    <p:extLst>
+      <p:ext uri="{BB962C8B-B14F-4D97-AF65-F5344CB8AC3E}">
+        <p14:creationId xmlns:p14="http://schemas.microsoft.com/office/powerpoint/2010/main" val="3849775906"/>
+      </p:ext>
+    </p:extLst>
+  </p:cSld>
+  <p:clrMapOvr>
+    <a:masterClrMapping/>
+  </p:clrMapOvr>
+</p:sldLayout>
+</file>
+
 <file path=ppt/slideLayouts/slideLayout2.xml><?xml version="1.0" encoding="utf-8"?>
+<p:sldLayout xmlns:a="http://schemas.openxmlformats.org/drawingml/2006/main" xmlns:r="http://schemas.openxmlformats.org/officeDocument/2006/relationships" xmlns:p="http://schemas.openxmlformats.org/presentationml/2006/main" preserve="1" userDrawn="1">
+  <p:cSld name="1_Tekst">
+    <p:spTree>
+      <p:nvGrpSpPr>
+        <p:cNvPr id="1" name=""/>
+        <p:cNvGrpSpPr/>
+        <p:nvPr/>
+      </p:nvGrpSpPr>
+      <p:grpSpPr>
+        <a:xfrm>
+          <a:off x="0" y="0"/>
+          <a:ext cx="0" cy="0"/>
+          <a:chOff x="0" y="0"/>
+          <a:chExt cx="0" cy="0"/>
+        </a:xfrm>
+      </p:grpSpPr>
+      <p:cxnSp>
+        <p:nvCxnSpPr>
+          <p:cNvPr id="2" name="Rechter scheidingslijn">
+            <a:extLst>
+              <a:ext uri="{FF2B5EF4-FFF2-40B4-BE49-F238E27FC236}">
+                <a16:creationId xmlns:a16="http://schemas.microsoft.com/office/drawing/2014/main" id="{4F24702C-E64E-2547-EF7A-D18982DAC4CD}"/>
+              </a:ext>
+            </a:extLst>
+          </p:cNvPr>
+          <p:cNvCxnSpPr>
+            <a:cxnSpLocks/>
+          </p:cNvCxnSpPr>
+          <p:nvPr userDrawn="1"/>
+        </p:nvCxnSpPr>
+        <p:spPr>
+          <a:xfrm flipV="1">
+            <a:off x="8051825" y="1519200"/>
+            <a:ext cx="0" cy="4881600"/>
+          </a:xfrm>
+          <a:prstGeom prst="line">
+            <a:avLst/>
+          </a:prstGeom>
+          <a:ln w="12700">
+            <a:solidFill>
+              <a:schemeClr val="tx2">
+                <a:lumMod val="20000"/>
+                <a:lumOff val="80000"/>
+              </a:schemeClr>
+            </a:solidFill>
+          </a:ln>
+        </p:spPr>
+        <p:style>
+          <a:lnRef idx="1">
+            <a:schemeClr val="accent1"/>
+          </a:lnRef>
+          <a:fillRef idx="0">
+            <a:schemeClr val="accent1"/>
+          </a:fillRef>
+          <a:effectRef idx="0">
+            <a:schemeClr val="accent1"/>
+          </a:effectRef>
+          <a:fontRef idx="minor">
+            <a:schemeClr val="tx1"/>
+          </a:fontRef>
+        </p:style>
+      </p:cxnSp>
+      <p:cxnSp>
+        <p:nvCxnSpPr>
+          <p:cNvPr id="5" name="Linker scheidingslijn">
+            <a:extLst>
+              <a:ext uri="{FF2B5EF4-FFF2-40B4-BE49-F238E27FC236}">
+                <a16:creationId xmlns:a16="http://schemas.microsoft.com/office/drawing/2014/main" id="{024B5762-4C9B-2E1A-D584-EA7C43CAD9B0}"/>
+              </a:ext>
+            </a:extLst>
+          </p:cNvPr>
+          <p:cNvCxnSpPr>
+            <a:cxnSpLocks/>
+          </p:cNvCxnSpPr>
+          <p:nvPr userDrawn="1"/>
+        </p:nvCxnSpPr>
+        <p:spPr>
+          <a:xfrm flipV="1">
+            <a:off x="4140175" y="1519200"/>
+            <a:ext cx="0" cy="4881600"/>
+          </a:xfrm>
+          <a:prstGeom prst="line">
+            <a:avLst/>
+          </a:prstGeom>
+          <a:ln w="12700">
+            <a:solidFill>
+              <a:schemeClr val="tx2">
+                <a:lumMod val="20000"/>
+                <a:lumOff val="80000"/>
+              </a:schemeClr>
+            </a:solidFill>
+          </a:ln>
+        </p:spPr>
+        <p:style>
+          <a:lnRef idx="1">
+            <a:schemeClr val="accent1"/>
+          </a:lnRef>
+          <a:fillRef idx="0">
+            <a:schemeClr val="accent1"/>
+          </a:fillRef>
+          <a:effectRef idx="0">
+            <a:schemeClr val="accent1"/>
+          </a:effectRef>
+          <a:fontRef idx="minor">
+            <a:schemeClr val="tx1"/>
+          </a:fontRef>
+        </p:style>
+      </p:cxnSp>
+      <p:sp>
+        <p:nvSpPr>
+          <p:cNvPr id="6" name="Rechtervlak" hidden="1">
+            <a:extLst>
+              <a:ext uri="{FF2B5EF4-FFF2-40B4-BE49-F238E27FC236}">
+                <a16:creationId xmlns:a16="http://schemas.microsoft.com/office/drawing/2014/main" id="{C48817EE-9108-2543-1BCB-27B17B31E919}"/>
+              </a:ext>
+            </a:extLst>
+          </p:cNvPr>
+          <p:cNvSpPr/>
+          <p:nvPr userDrawn="1"/>
+        </p:nvSpPr>
+        <p:spPr>
+          <a:xfrm>
+            <a:off x="8280408" y="1520170"/>
+            <a:ext cx="3454375" cy="4880630"/>
+          </a:xfrm>
+          <a:prstGeom prst="rect">
+            <a:avLst/>
+          </a:prstGeom>
+          <a:solidFill>
+            <a:schemeClr val="bg1">
+              <a:lumMod val="95000"/>
+            </a:schemeClr>
+          </a:solidFill>
+          <a:ln>
+            <a:noFill/>
+          </a:ln>
+        </p:spPr>
+        <p:style>
+          <a:lnRef idx="2">
+            <a:schemeClr val="accent1">
+              <a:shade val="15000"/>
+            </a:schemeClr>
+          </a:lnRef>
+          <a:fillRef idx="1">
+            <a:schemeClr val="accent1"/>
+          </a:fillRef>
+          <a:effectRef idx="0">
+            <a:schemeClr val="accent1"/>
+          </a:effectRef>
+          <a:fontRef idx="minor">
+            <a:schemeClr val="lt1"/>
+          </a:fontRef>
+        </p:style>
+        <p:txBody>
+          <a:bodyPr rtlCol="0" anchor="ctr"/>
+          <a:lstStyle/>
+          <a:p>
+            <a:pPr algn="ctr"/>
+            <a:endParaRPr lang="nl-NL" sz="3124"/>
+          </a:p>
+        </p:txBody>
+      </p:sp>
+      <p:sp>
+        <p:nvSpPr>
+          <p:cNvPr id="7" name="Middenvlak" hidden="1">
+            <a:extLst>
+              <a:ext uri="{FF2B5EF4-FFF2-40B4-BE49-F238E27FC236}">
+                <a16:creationId xmlns:a16="http://schemas.microsoft.com/office/drawing/2014/main" id="{E136F790-08A3-3874-D920-266B03612B9F}"/>
+              </a:ext>
+            </a:extLst>
+          </p:cNvPr>
+          <p:cNvSpPr/>
+          <p:nvPr userDrawn="1"/>
+        </p:nvSpPr>
+        <p:spPr>
+          <a:xfrm>
+            <a:off x="4368869" y="1519200"/>
+            <a:ext cx="3454375" cy="4880630"/>
+          </a:xfrm>
+          <a:prstGeom prst="rect">
+            <a:avLst/>
+          </a:prstGeom>
+          <a:solidFill>
+            <a:schemeClr val="bg1">
+              <a:lumMod val="95000"/>
+            </a:schemeClr>
+          </a:solidFill>
+          <a:ln>
+            <a:noFill/>
+          </a:ln>
+        </p:spPr>
+        <p:style>
+          <a:lnRef idx="2">
+            <a:schemeClr val="accent1">
+              <a:shade val="15000"/>
+            </a:schemeClr>
+          </a:lnRef>
+          <a:fillRef idx="1">
+            <a:schemeClr val="accent1"/>
+          </a:fillRef>
+          <a:effectRef idx="0">
+            <a:schemeClr val="accent1"/>
+          </a:effectRef>
+          <a:fontRef idx="minor">
+            <a:schemeClr val="lt1"/>
+          </a:fontRef>
+        </p:style>
+        <p:txBody>
+          <a:bodyPr rtlCol="0" anchor="ctr"/>
+          <a:lstStyle/>
+          <a:p>
+            <a:pPr algn="ctr"/>
+            <a:endParaRPr lang="nl-NL" sz="3124"/>
+          </a:p>
+        </p:txBody>
+      </p:sp>
+      <p:sp>
+        <p:nvSpPr>
+          <p:cNvPr id="8" name="Linkervlak" hidden="1">
+            <a:extLst>
+              <a:ext uri="{FF2B5EF4-FFF2-40B4-BE49-F238E27FC236}">
+                <a16:creationId xmlns:a16="http://schemas.microsoft.com/office/drawing/2014/main" id="{D6EE9A9C-0C94-24AE-98D4-30E97FD9D95E}"/>
+              </a:ext>
+            </a:extLst>
+          </p:cNvPr>
+          <p:cNvSpPr/>
+          <p:nvPr userDrawn="1"/>
+        </p:nvSpPr>
+        <p:spPr>
+          <a:xfrm>
+            <a:off x="457220" y="1520170"/>
+            <a:ext cx="3454375" cy="4880630"/>
+          </a:xfrm>
+          <a:prstGeom prst="rect">
+            <a:avLst/>
+          </a:prstGeom>
+          <a:solidFill>
+            <a:schemeClr val="bg1">
+              <a:lumMod val="95000"/>
+            </a:schemeClr>
+          </a:solidFill>
+          <a:ln>
+            <a:noFill/>
+          </a:ln>
+        </p:spPr>
+        <p:style>
+          <a:lnRef idx="2">
+            <a:schemeClr val="accent1">
+              <a:shade val="15000"/>
+            </a:schemeClr>
+          </a:lnRef>
+          <a:fillRef idx="1">
+            <a:schemeClr val="accent1"/>
+          </a:fillRef>
+          <a:effectRef idx="0">
+            <a:schemeClr val="accent1"/>
+          </a:effectRef>
+          <a:fontRef idx="minor">
+            <a:schemeClr val="lt1"/>
+          </a:fontRef>
+        </p:style>
+        <p:txBody>
+          <a:bodyPr rtlCol="0" anchor="ctr"/>
+          <a:lstStyle/>
+          <a:p>
+            <a:pPr algn="ctr"/>
+            <a:endParaRPr lang="nl-NL" sz="3124"/>
+          </a:p>
+        </p:txBody>
+      </p:sp>
+      <p:sp>
+        <p:nvSpPr>
+          <p:cNvPr id="10" name="Driehoek">
+            <a:extLst>
+              <a:ext uri="{FF2B5EF4-FFF2-40B4-BE49-F238E27FC236}">
+                <a16:creationId xmlns:a16="http://schemas.microsoft.com/office/drawing/2014/main" id="{D382B982-138B-EF5F-A4A3-F952DD1C516E}"/>
+              </a:ext>
+            </a:extLst>
+          </p:cNvPr>
+          <p:cNvSpPr/>
+          <p:nvPr userDrawn="1"/>
+        </p:nvSpPr>
+        <p:spPr>
+          <a:xfrm rot="10800000" flipH="1">
+            <a:off x="9719594" y="0"/>
+            <a:ext cx="576000" cy="1066800"/>
+          </a:xfrm>
+          <a:prstGeom prst="rtTriangle">
+            <a:avLst/>
+          </a:prstGeom>
+          <a:solidFill>
+            <a:schemeClr val="accent1"/>
+          </a:solidFill>
+          <a:ln>
+            <a:noFill/>
+          </a:ln>
+        </p:spPr>
+        <p:style>
+          <a:lnRef idx="2">
+            <a:schemeClr val="accent1">
+              <a:shade val="50000"/>
+            </a:schemeClr>
+          </a:lnRef>
+          <a:fillRef idx="1">
+            <a:schemeClr val="accent1"/>
+          </a:fillRef>
+          <a:effectRef idx="0">
+            <a:schemeClr val="accent1"/>
+          </a:effectRef>
+          <a:fontRef idx="minor">
+            <a:schemeClr val="lt1"/>
+          </a:fontRef>
+        </p:style>
+        <p:txBody>
+          <a:bodyPr rtlCol="0" anchor="ctr"/>
+          <a:lstStyle/>
+          <a:p>
+            <a:pPr algn="l"/>
+            <a:endParaRPr lang="en-US" sz="2391" b="1">
+              <a:latin typeface="+mn-lt"/>
+            </a:endParaRPr>
+          </a:p>
+        </p:txBody>
+      </p:sp>
+      <p:sp>
+        <p:nvSpPr>
+          <p:cNvPr id="11" name="Titelblok">
+            <a:extLst>
+              <a:ext uri="{FF2B5EF4-FFF2-40B4-BE49-F238E27FC236}">
+                <a16:creationId xmlns:a16="http://schemas.microsoft.com/office/drawing/2014/main" id="{25BB0762-1AD0-F5A1-E01E-F53682EB8F5D}"/>
+              </a:ext>
+            </a:extLst>
+          </p:cNvPr>
+          <p:cNvSpPr/>
+          <p:nvPr userDrawn="1"/>
+        </p:nvSpPr>
+        <p:spPr>
+          <a:xfrm>
+            <a:off x="1" y="0"/>
+            <a:ext cx="9719589" cy="1066800"/>
+          </a:xfrm>
+          <a:prstGeom prst="rect">
+            <a:avLst/>
+          </a:prstGeom>
+          <a:solidFill>
+            <a:schemeClr val="accent1"/>
+          </a:solidFill>
+          <a:ln>
+            <a:noFill/>
+          </a:ln>
+        </p:spPr>
+        <p:style>
+          <a:lnRef idx="2">
+            <a:schemeClr val="accent1">
+              <a:shade val="50000"/>
+            </a:schemeClr>
+          </a:lnRef>
+          <a:fillRef idx="1">
+            <a:schemeClr val="accent1"/>
+          </a:fillRef>
+          <a:effectRef idx="0">
+            <a:schemeClr val="accent1"/>
+          </a:effectRef>
+          <a:fontRef idx="minor">
+            <a:schemeClr val="lt1"/>
+          </a:fontRef>
+        </p:style>
+        <p:txBody>
+          <a:bodyPr rtlCol="0" anchor="ctr"/>
+          <a:lstStyle/>
+          <a:p>
+            <a:pPr marL="0" indent="360388" algn="l"/>
+            <a:r>
+              <a:rPr lang="nl-NL" sz="2400" b="1" noProof="0" dirty="0">
+                <a:latin typeface="+mj-lt"/>
+              </a:rPr>
+              <a:t>Respons</a:t>
+            </a:r>
+          </a:p>
+        </p:txBody>
+      </p:sp>
+      <p:sp>
+        <p:nvSpPr>
+          <p:cNvPr id="13" name="Tekstvak">
+            <a:extLst>
+              <a:ext uri="{FF2B5EF4-FFF2-40B4-BE49-F238E27FC236}">
+                <a16:creationId xmlns:a16="http://schemas.microsoft.com/office/drawing/2014/main" id="{B5C74B2A-748B-0740-1934-6885F2B1E828}"/>
+              </a:ext>
+            </a:extLst>
+          </p:cNvPr>
+          <p:cNvSpPr txBox="1"/>
+          <p:nvPr userDrawn="1"/>
+        </p:nvSpPr>
+        <p:spPr>
+          <a:xfrm>
+            <a:off x="458960" y="1519200"/>
+            <a:ext cx="3456000" cy="577081"/>
+          </a:xfrm>
+          <a:prstGeom prst="rect">
+            <a:avLst/>
+          </a:prstGeom>
+          <a:noFill/>
+        </p:spPr>
+        <p:txBody>
+          <a:bodyPr rot="0" spcFirstLastPara="0" vert="horz" wrap="square" lIns="91440" tIns="45720" rIns="91440" bIns="45720" numCol="1" spcCol="0" rtlCol="0" fromWordArt="0" anchor="t" anchorCtr="0" forceAA="0" compatLnSpc="1">
+            <a:prstTxWarp prst="textNoShape">
+              <a:avLst/>
+            </a:prstTxWarp>
+            <a:spAutoFit/>
+          </a:bodyPr>
+          <a:lstStyle>
+            <a:defPPr>
+              <a:defRPr lang="nl-NL"/>
+            </a:defPPr>
+            <a:lvl1pPr marL="0" algn="l" defTabSz="839852" rtl="0" eaLnBrk="1" latinLnBrk="0" hangingPunct="1">
+              <a:defRPr sz="1653" kern="1200">
+                <a:solidFill>
+                  <a:schemeClr val="tx1"/>
+                </a:solidFill>
+                <a:latin typeface="+mn-lt"/>
+                <a:ea typeface="+mn-ea"/>
+                <a:cs typeface="+mn-cs"/>
+              </a:defRPr>
+            </a:lvl1pPr>
+            <a:lvl2pPr marL="419926" algn="l" defTabSz="839852" rtl="0" eaLnBrk="1" latinLnBrk="0" hangingPunct="1">
+              <a:defRPr sz="1653" kern="1200">
+                <a:solidFill>
+                  <a:schemeClr val="tx1"/>
+                </a:solidFill>
+                <a:latin typeface="+mn-lt"/>
+                <a:ea typeface="+mn-ea"/>
+                <a:cs typeface="+mn-cs"/>
+              </a:defRPr>
+            </a:lvl2pPr>
+            <a:lvl3pPr marL="839852" algn="l" defTabSz="839852" rtl="0" eaLnBrk="1" latinLnBrk="0" hangingPunct="1">
+              <a:defRPr sz="1653" kern="1200">
+                <a:solidFill>
+                  <a:schemeClr val="tx1"/>
+                </a:solidFill>
+                <a:latin typeface="+mn-lt"/>
+                <a:ea typeface="+mn-ea"/>
+                <a:cs typeface="+mn-cs"/>
+              </a:defRPr>
+            </a:lvl3pPr>
+            <a:lvl4pPr marL="1259779" algn="l" defTabSz="839852" rtl="0" eaLnBrk="1" latinLnBrk="0" hangingPunct="1">
+              <a:defRPr sz="1653" kern="1200">
+                <a:solidFill>
+                  <a:schemeClr val="tx1"/>
+                </a:solidFill>
+                <a:latin typeface="+mn-lt"/>
+                <a:ea typeface="+mn-ea"/>
+                <a:cs typeface="+mn-cs"/>
+              </a:defRPr>
+            </a:lvl4pPr>
+            <a:lvl5pPr marL="1679704" algn="l" defTabSz="839852" rtl="0" eaLnBrk="1" latinLnBrk="0" hangingPunct="1">
+              <a:defRPr sz="1653" kern="1200">
+                <a:solidFill>
+                  <a:schemeClr val="tx1"/>
+                </a:solidFill>
+                <a:latin typeface="+mn-lt"/>
+                <a:ea typeface="+mn-ea"/>
+                <a:cs typeface="+mn-cs"/>
+              </a:defRPr>
+            </a:lvl5pPr>
+            <a:lvl6pPr marL="2099630" algn="l" defTabSz="839852" rtl="0" eaLnBrk="1" latinLnBrk="0" hangingPunct="1">
+              <a:defRPr sz="1653" kern="1200">
+                <a:solidFill>
+                  <a:schemeClr val="tx1"/>
+                </a:solidFill>
+                <a:latin typeface="+mn-lt"/>
+                <a:ea typeface="+mn-ea"/>
+                <a:cs typeface="+mn-cs"/>
+              </a:defRPr>
+            </a:lvl6pPr>
+            <a:lvl7pPr marL="2519556" algn="l" defTabSz="839852" rtl="0" eaLnBrk="1" latinLnBrk="0" hangingPunct="1">
+              <a:defRPr sz="1653" kern="1200">
+                <a:solidFill>
+                  <a:schemeClr val="tx1"/>
+                </a:solidFill>
+                <a:latin typeface="+mn-lt"/>
+                <a:ea typeface="+mn-ea"/>
+                <a:cs typeface="+mn-cs"/>
+              </a:defRPr>
+            </a:lvl7pPr>
+            <a:lvl8pPr marL="2939482" algn="l" defTabSz="839852" rtl="0" eaLnBrk="1" latinLnBrk="0" hangingPunct="1">
+              <a:defRPr sz="1653" kern="1200">
+                <a:solidFill>
+                  <a:schemeClr val="tx1"/>
+                </a:solidFill>
+                <a:latin typeface="+mn-lt"/>
+                <a:ea typeface="+mn-ea"/>
+                <a:cs typeface="+mn-cs"/>
+              </a:defRPr>
+            </a:lvl8pPr>
+            <a:lvl9pPr marL="3359408" algn="l" defTabSz="839852" rtl="0" eaLnBrk="1" latinLnBrk="0" hangingPunct="1">
+              <a:defRPr sz="1653" kern="1200">
+                <a:solidFill>
+                  <a:schemeClr val="tx1"/>
+                </a:solidFill>
+                <a:latin typeface="+mn-lt"/>
+                <a:ea typeface="+mn-ea"/>
+                <a:cs typeface="+mn-cs"/>
+              </a:defRPr>
+            </a:lvl9pPr>
+          </a:lstStyle>
+          <a:p>
+            <a:pPr marL="0" marR="0" lvl="0" indent="0" algn="l" defTabSz="839909" rtl="0" eaLnBrk="1" fontAlgn="auto" latinLnBrk="0" hangingPunct="1">
+              <a:lnSpc>
+                <a:spcPct val="100000"/>
+              </a:lnSpc>
+              <a:spcBef>
+                <a:spcPts val="0"/>
+              </a:spcBef>
+              <a:spcAft>
+                <a:spcPts val="0"/>
+              </a:spcAft>
+              <a:buClrTx/>
+              <a:buSzTx/>
+              <a:buFontTx/>
+              <a:buNone/>
+              <a:tabLst/>
+              <a:defRPr/>
+            </a:pPr>
+            <a:r>
+              <a:rPr lang="nl-NL" sz="1050" b="1" noProof="0" dirty="0">
+                <a:latin typeface="+mj-lt"/>
+              </a:rPr>
+              <a:t>Respons</a:t>
+            </a:r>
+            <a:endParaRPr lang="nl-NL" sz="1050" b="1" kern="1200" dirty="0">
+              <a:solidFill>
+                <a:schemeClr val="tx1"/>
+              </a:solidFill>
+              <a:latin typeface="+mn-lt"/>
+              <a:ea typeface="+mn-ea"/>
+              <a:cs typeface="+mn-cs"/>
+            </a:endParaRPr>
+          </a:p>
+          <a:p>
+            <a:pPr marL="0" marR="0" lvl="0" indent="0" algn="l" defTabSz="839909" rtl="0" eaLnBrk="1" fontAlgn="auto" latinLnBrk="0" hangingPunct="1">
+              <a:lnSpc>
+                <a:spcPct val="100000"/>
+              </a:lnSpc>
+              <a:spcBef>
+                <a:spcPts val="0"/>
+              </a:spcBef>
+              <a:spcAft>
+                <a:spcPts val="0"/>
+              </a:spcAft>
+              <a:buClrTx/>
+              <a:buSzTx/>
+              <a:buFontTx/>
+              <a:buNone/>
+              <a:tabLst/>
+              <a:defRPr/>
+            </a:pPr>
+            <a:endParaRPr lang="nl-NL" sz="1050" b="1" kern="1200" dirty="0">
+              <a:solidFill>
+                <a:schemeClr val="tx1"/>
+              </a:solidFill>
+              <a:latin typeface="+mn-lt"/>
+              <a:ea typeface="+mn-ea"/>
+              <a:cs typeface="+mn-cs"/>
+            </a:endParaRPr>
+          </a:p>
+          <a:p>
+            <a:pPr marL="0" marR="0" lvl="0" indent="0" algn="l" defTabSz="839909" rtl="0" eaLnBrk="1" fontAlgn="auto" latinLnBrk="0" hangingPunct="1">
+              <a:lnSpc>
+                <a:spcPct val="100000"/>
+              </a:lnSpc>
+              <a:spcBef>
+                <a:spcPts val="0"/>
+              </a:spcBef>
+              <a:spcAft>
+                <a:spcPts val="0"/>
+              </a:spcAft>
+              <a:buClrTx/>
+              <a:buSzTx/>
+              <a:buFontTx/>
+              <a:buNone/>
+              <a:tabLst/>
+              <a:defRPr/>
+            </a:pPr>
+            <a:r>
+              <a:rPr lang="nl-NL" sz="1050" b="0" kern="1200" dirty="0">
+                <a:solidFill>
+                  <a:schemeClr val="tx1"/>
+                </a:solidFill>
+                <a:latin typeface="+mn-lt"/>
+                <a:ea typeface="+mn-ea"/>
+                <a:cs typeface="+mn-cs"/>
+              </a:rPr>
+              <a:t>Tekst.</a:t>
+            </a:r>
+          </a:p>
+        </p:txBody>
+      </p:sp>
+      <p:sp>
+        <p:nvSpPr>
+          <p:cNvPr id="17" name="Respons">
+            <a:extLst>
+              <a:ext uri="{FF2B5EF4-FFF2-40B4-BE49-F238E27FC236}">
+                <a16:creationId xmlns:a16="http://schemas.microsoft.com/office/drawing/2014/main" id="{33EB2F31-A51E-D3F5-6CA3-3AC4B7CB1972}"/>
+              </a:ext>
+            </a:extLst>
+          </p:cNvPr>
+          <p:cNvSpPr>
+            <a:spLocks noGrp="1"/>
+          </p:cNvSpPr>
+          <p:nvPr>
+            <p:ph type="body" sz="quarter" idx="24"/>
+          </p:nvPr>
+        </p:nvSpPr>
+        <p:spPr>
+          <a:xfrm>
+            <a:off x="4368000" y="1519200"/>
+            <a:ext cx="3456000" cy="2376000"/>
+          </a:xfrm>
+          <a:prstGeom prst="rect">
+            <a:avLst/>
+          </a:prstGeom>
+        </p:spPr>
+        <p:txBody>
+          <a:bodyPr/>
+          <a:lstStyle>
+            <a:lvl1pPr marL="0" indent="0">
+              <a:buFont typeface="Arial" panose="020B0604020202020204" pitchFamily="34" charset="0"/>
+              <a:buNone/>
+              <a:defRPr sz="1050">
+                <a:latin typeface="+mn-lt"/>
+              </a:defRPr>
+            </a:lvl1pPr>
+            <a:lvl2pPr marL="669589" indent="0">
+              <a:buNone/>
+              <a:defRPr sz="1050">
+                <a:latin typeface="Century Gothic" panose="020B0502020202020204" pitchFamily="34" charset="0"/>
+              </a:defRPr>
+            </a:lvl2pPr>
+            <a:lvl3pPr marL="1339180" indent="0">
+              <a:buNone/>
+              <a:defRPr sz="1050">
+                <a:latin typeface="Century Gothic" panose="020B0502020202020204" pitchFamily="34" charset="0"/>
+              </a:defRPr>
+            </a:lvl3pPr>
+            <a:lvl4pPr marL="2008771" indent="0">
+              <a:buNone/>
+              <a:defRPr sz="1050">
+                <a:latin typeface="Century Gothic" panose="020B0502020202020204" pitchFamily="34" charset="0"/>
+              </a:defRPr>
+            </a:lvl4pPr>
+            <a:lvl5pPr marL="2678360" indent="0">
+              <a:buNone/>
+              <a:defRPr sz="1050">
+                <a:latin typeface="Century Gothic" panose="020B0502020202020204" pitchFamily="34" charset="0"/>
+              </a:defRPr>
+            </a:lvl5pPr>
+          </a:lstStyle>
+          <a:p>
+            <a:pPr lvl="0"/>
+            <a:endParaRPr lang="nl-NL" dirty="0"/>
+          </a:p>
+        </p:txBody>
+      </p:sp>
+    </p:spTree>
+    <p:extLst>
+      <p:ext uri="{BB962C8B-B14F-4D97-AF65-F5344CB8AC3E}">
+        <p14:creationId xmlns:p14="http://schemas.microsoft.com/office/powerpoint/2010/main" val="2726465838"/>
+      </p:ext>
+    </p:extLst>
+  </p:cSld>
+  <p:clrMapOvr>
+    <a:masterClrMapping/>
+  </p:clrMapOvr>
+</p:sldLayout>
+</file>
+
+<file path=ppt/slideLayouts/slideLayout3.xml><?xml version="1.0" encoding="utf-8"?>
 <p:sldLayout xmlns:a="http://schemas.openxmlformats.org/drawingml/2006/main" xmlns:r="http://schemas.openxmlformats.org/officeDocument/2006/relationships" xmlns:p="http://schemas.openxmlformats.org/presentationml/2006/main" preserve="1" userDrawn="1">
   <p:cSld name="Vergelijking in tekst">
     <p:spTree>
@@ -3489,7 +4866,7 @@
 </p:sldLayout>
 </file>
 
-<file path=ppt/slideLayouts/slideLayout3.xml><?xml version="1.0" encoding="utf-8"?>
+<file path=ppt/slideLayouts/slideLayout4.xml><?xml version="1.0" encoding="utf-8"?>
 <p:sldLayout xmlns:a="http://schemas.openxmlformats.org/drawingml/2006/main" xmlns:r="http://schemas.openxmlformats.org/officeDocument/2006/relationships" xmlns:p="http://schemas.openxmlformats.org/presentationml/2006/main" preserve="1" userDrawn="1">
   <p:cSld name="Percentage in tekst">
     <p:spTree>
@@ -4361,7 +5738,7 @@
 </p:sldLayout>
 </file>
 
-<file path=ppt/slideLayouts/slideLayout4.xml><?xml version="1.0" encoding="utf-8"?>
+<file path=ppt/slideLayouts/slideLayout5.xml><?xml version="1.0" encoding="utf-8"?>
 <p:sldLayout xmlns:a="http://schemas.openxmlformats.org/drawingml/2006/main" xmlns:r="http://schemas.openxmlformats.org/officeDocument/2006/relationships" xmlns:p="http://schemas.openxmlformats.org/presentationml/2006/main" preserve="1" userDrawn="1">
   <p:cSld name="Percentage">
     <p:spTree>
@@ -5501,7 +6878,7 @@
 </p:sldLayout>
 </file>
 
-<file path=ppt/slideLayouts/slideLayout5.xml><?xml version="1.0" encoding="utf-8"?>
+<file path=ppt/slideLayouts/slideLayout6.xml><?xml version="1.0" encoding="utf-8"?>
 <p:sldLayout xmlns:a="http://schemas.openxmlformats.org/drawingml/2006/main" xmlns:r="http://schemas.openxmlformats.org/officeDocument/2006/relationships" xmlns:p="http://schemas.openxmlformats.org/presentationml/2006/main" preserve="1" userDrawn="1">
   <p:cSld name="Staafgrafiek">
     <p:spTree>
@@ -6309,7 +7686,7 @@
 </p:sldLayout>
 </file>
 
-<file path=ppt/slideLayouts/slideLayout6.xml><?xml version="1.0" encoding="utf-8"?>
+<file path=ppt/slideLayouts/slideLayout7.xml><?xml version="1.0" encoding="utf-8"?>
 <p:sldLayout xmlns:a="http://schemas.openxmlformats.org/drawingml/2006/main" xmlns:r="http://schemas.openxmlformats.org/officeDocument/2006/relationships" xmlns:p="http://schemas.openxmlformats.org/presentationml/2006/main" preserve="1" userDrawn="1">
   <p:cSld name="Trendgrafiek">
     <p:spTree>
@@ -7077,7 +8454,7 @@
 </p:sldLayout>
 </file>
 
-<file path=ppt/slideLayouts/slideLayout7.xml><?xml version="1.0" encoding="utf-8"?>
+<file path=ppt/slideLayouts/slideLayout8.xml><?xml version="1.0" encoding="utf-8"?>
 <p:sldLayout xmlns:a="http://schemas.openxmlformats.org/drawingml/2006/main" xmlns:r="http://schemas.openxmlformats.org/officeDocument/2006/relationships" xmlns:p="http://schemas.openxmlformats.org/presentationml/2006/main" preserve="1" userDrawn="1">
   <p:cSld name="Staafgrafiek gestapeld">
     <p:spTree>
@@ -7845,7 +9222,7 @@
 </p:sldLayout>
 </file>
 
-<file path=ppt/slideLayouts/slideLayout8.xml><?xml version="1.0" encoding="utf-8"?>
+<file path=ppt/slideLayouts/slideLayout9.xml><?xml version="1.0" encoding="utf-8"?>
 <p:sldLayout xmlns:a="http://schemas.openxmlformats.org/drawingml/2006/main" xmlns:r="http://schemas.openxmlformats.org/officeDocument/2006/relationships" xmlns:p="http://schemas.openxmlformats.org/presentationml/2006/main" preserve="1" userDrawn="1">
   <p:cSld name="TopN">
     <p:spTree>
@@ -8604,866 +9981,6 @@
     <p:extLst>
       <p:ext uri="{BB962C8B-B14F-4D97-AF65-F5344CB8AC3E}">
         <p14:creationId xmlns:p14="http://schemas.microsoft.com/office/powerpoint/2010/main" val="605840244"/>
-      </p:ext>
-    </p:extLst>
-  </p:cSld>
-  <p:clrMapOvr>
-    <a:masterClrMapping/>
-  </p:clrMapOvr>
-</p:sldLayout>
-</file>
-
-<file path=ppt/slideLayouts/slideLayout9.xml><?xml version="1.0" encoding="utf-8"?>
-<p:sldLayout xmlns:a="http://schemas.openxmlformats.org/drawingml/2006/main" xmlns:r="http://schemas.openxmlformats.org/officeDocument/2006/relationships" xmlns:p="http://schemas.openxmlformats.org/presentationml/2006/main" preserve="1" userDrawn="1">
-  <p:cSld name="Tabel">
-    <p:spTree>
-      <p:nvGrpSpPr>
-        <p:cNvPr id="1" name=""/>
-        <p:cNvGrpSpPr/>
-        <p:nvPr/>
-      </p:nvGrpSpPr>
-      <p:grpSpPr>
-        <a:xfrm>
-          <a:off x="0" y="0"/>
-          <a:ext cx="0" cy="0"/>
-          <a:chOff x="0" y="0"/>
-          <a:chExt cx="0" cy="0"/>
-        </a:xfrm>
-      </p:grpSpPr>
-      <p:cxnSp>
-        <p:nvCxnSpPr>
-          <p:cNvPr id="2" name="Rechter scheidingslijn">
-            <a:extLst>
-              <a:ext uri="{FF2B5EF4-FFF2-40B4-BE49-F238E27FC236}">
-                <a16:creationId xmlns:a16="http://schemas.microsoft.com/office/drawing/2014/main" id="{4F24702C-E64E-2547-EF7A-D18982DAC4CD}"/>
-              </a:ext>
-            </a:extLst>
-          </p:cNvPr>
-          <p:cNvCxnSpPr>
-            <a:cxnSpLocks/>
-          </p:cNvCxnSpPr>
-          <p:nvPr userDrawn="1"/>
-        </p:nvCxnSpPr>
-        <p:spPr>
-          <a:xfrm flipV="1">
-            <a:off x="8051825" y="1519200"/>
-            <a:ext cx="0" cy="4881600"/>
-          </a:xfrm>
-          <a:prstGeom prst="line">
-            <a:avLst/>
-          </a:prstGeom>
-          <a:ln w="12700">
-            <a:solidFill>
-              <a:schemeClr val="tx2">
-                <a:lumMod val="20000"/>
-                <a:lumOff val="80000"/>
-              </a:schemeClr>
-            </a:solidFill>
-          </a:ln>
-        </p:spPr>
-        <p:style>
-          <a:lnRef idx="1">
-            <a:schemeClr val="accent1"/>
-          </a:lnRef>
-          <a:fillRef idx="0">
-            <a:schemeClr val="accent1"/>
-          </a:fillRef>
-          <a:effectRef idx="0">
-            <a:schemeClr val="accent1"/>
-          </a:effectRef>
-          <a:fontRef idx="minor">
-            <a:schemeClr val="tx1"/>
-          </a:fontRef>
-        </p:style>
-      </p:cxnSp>
-      <p:cxnSp>
-        <p:nvCxnSpPr>
-          <p:cNvPr id="5" name="Linker scheidingslijn">
-            <a:extLst>
-              <a:ext uri="{FF2B5EF4-FFF2-40B4-BE49-F238E27FC236}">
-                <a16:creationId xmlns:a16="http://schemas.microsoft.com/office/drawing/2014/main" id="{024B5762-4C9B-2E1A-D584-EA7C43CAD9B0}"/>
-              </a:ext>
-            </a:extLst>
-          </p:cNvPr>
-          <p:cNvCxnSpPr>
-            <a:cxnSpLocks/>
-          </p:cNvCxnSpPr>
-          <p:nvPr userDrawn="1"/>
-        </p:nvCxnSpPr>
-        <p:spPr>
-          <a:xfrm flipV="1">
-            <a:off x="4140175" y="1519200"/>
-            <a:ext cx="0" cy="4881600"/>
-          </a:xfrm>
-          <a:prstGeom prst="line">
-            <a:avLst/>
-          </a:prstGeom>
-          <a:ln w="12700">
-            <a:solidFill>
-              <a:schemeClr val="tx2">
-                <a:lumMod val="20000"/>
-                <a:lumOff val="80000"/>
-              </a:schemeClr>
-            </a:solidFill>
-          </a:ln>
-        </p:spPr>
-        <p:style>
-          <a:lnRef idx="1">
-            <a:schemeClr val="accent1"/>
-          </a:lnRef>
-          <a:fillRef idx="0">
-            <a:schemeClr val="accent1"/>
-          </a:fillRef>
-          <a:effectRef idx="0">
-            <a:schemeClr val="accent1"/>
-          </a:effectRef>
-          <a:fontRef idx="minor">
-            <a:schemeClr val="tx1"/>
-          </a:fontRef>
-        </p:style>
-      </p:cxnSp>
-      <p:sp>
-        <p:nvSpPr>
-          <p:cNvPr id="6" name="Rechtervlak" hidden="1">
-            <a:extLst>
-              <a:ext uri="{FF2B5EF4-FFF2-40B4-BE49-F238E27FC236}">
-                <a16:creationId xmlns:a16="http://schemas.microsoft.com/office/drawing/2014/main" id="{C48817EE-9108-2543-1BCB-27B17B31E919}"/>
-              </a:ext>
-            </a:extLst>
-          </p:cNvPr>
-          <p:cNvSpPr/>
-          <p:nvPr userDrawn="1"/>
-        </p:nvSpPr>
-        <p:spPr>
-          <a:xfrm>
-            <a:off x="8280408" y="1520170"/>
-            <a:ext cx="3454375" cy="4880630"/>
-          </a:xfrm>
-          <a:prstGeom prst="rect">
-            <a:avLst/>
-          </a:prstGeom>
-          <a:solidFill>
-            <a:schemeClr val="bg1">
-              <a:lumMod val="95000"/>
-            </a:schemeClr>
-          </a:solidFill>
-          <a:ln>
-            <a:noFill/>
-          </a:ln>
-        </p:spPr>
-        <p:style>
-          <a:lnRef idx="2">
-            <a:schemeClr val="accent1">
-              <a:shade val="15000"/>
-            </a:schemeClr>
-          </a:lnRef>
-          <a:fillRef idx="1">
-            <a:schemeClr val="accent1"/>
-          </a:fillRef>
-          <a:effectRef idx="0">
-            <a:schemeClr val="accent1"/>
-          </a:effectRef>
-          <a:fontRef idx="minor">
-            <a:schemeClr val="lt1"/>
-          </a:fontRef>
-        </p:style>
-        <p:txBody>
-          <a:bodyPr rtlCol="0" anchor="ctr"/>
-          <a:lstStyle/>
-          <a:p>
-            <a:pPr algn="ctr"/>
-            <a:endParaRPr lang="nl-NL" sz="3124"/>
-          </a:p>
-        </p:txBody>
-      </p:sp>
-      <p:sp>
-        <p:nvSpPr>
-          <p:cNvPr id="7" name="Middenvlak" hidden="1">
-            <a:extLst>
-              <a:ext uri="{FF2B5EF4-FFF2-40B4-BE49-F238E27FC236}">
-                <a16:creationId xmlns:a16="http://schemas.microsoft.com/office/drawing/2014/main" id="{E136F790-08A3-3874-D920-266B03612B9F}"/>
-              </a:ext>
-            </a:extLst>
-          </p:cNvPr>
-          <p:cNvSpPr/>
-          <p:nvPr userDrawn="1"/>
-        </p:nvSpPr>
-        <p:spPr>
-          <a:xfrm>
-            <a:off x="4368869" y="1519200"/>
-            <a:ext cx="3454375" cy="4880630"/>
-          </a:xfrm>
-          <a:prstGeom prst="rect">
-            <a:avLst/>
-          </a:prstGeom>
-          <a:solidFill>
-            <a:schemeClr val="bg1">
-              <a:lumMod val="95000"/>
-            </a:schemeClr>
-          </a:solidFill>
-          <a:ln>
-            <a:noFill/>
-          </a:ln>
-        </p:spPr>
-        <p:style>
-          <a:lnRef idx="2">
-            <a:schemeClr val="accent1">
-              <a:shade val="15000"/>
-            </a:schemeClr>
-          </a:lnRef>
-          <a:fillRef idx="1">
-            <a:schemeClr val="accent1"/>
-          </a:fillRef>
-          <a:effectRef idx="0">
-            <a:schemeClr val="accent1"/>
-          </a:effectRef>
-          <a:fontRef idx="minor">
-            <a:schemeClr val="lt1"/>
-          </a:fontRef>
-        </p:style>
-        <p:txBody>
-          <a:bodyPr rtlCol="0" anchor="ctr"/>
-          <a:lstStyle/>
-          <a:p>
-            <a:pPr algn="ctr"/>
-            <a:endParaRPr lang="nl-NL" sz="3124"/>
-          </a:p>
-        </p:txBody>
-      </p:sp>
-      <p:sp>
-        <p:nvSpPr>
-          <p:cNvPr id="8" name="Linkervlak" hidden="1">
-            <a:extLst>
-              <a:ext uri="{FF2B5EF4-FFF2-40B4-BE49-F238E27FC236}">
-                <a16:creationId xmlns:a16="http://schemas.microsoft.com/office/drawing/2014/main" id="{D6EE9A9C-0C94-24AE-98D4-30E97FD9D95E}"/>
-              </a:ext>
-            </a:extLst>
-          </p:cNvPr>
-          <p:cNvSpPr/>
-          <p:nvPr userDrawn="1"/>
-        </p:nvSpPr>
-        <p:spPr>
-          <a:xfrm>
-            <a:off x="457220" y="1520170"/>
-            <a:ext cx="3454375" cy="4880630"/>
-          </a:xfrm>
-          <a:prstGeom prst="rect">
-            <a:avLst/>
-          </a:prstGeom>
-          <a:solidFill>
-            <a:schemeClr val="bg1">
-              <a:lumMod val="95000"/>
-            </a:schemeClr>
-          </a:solidFill>
-          <a:ln>
-            <a:noFill/>
-          </a:ln>
-        </p:spPr>
-        <p:style>
-          <a:lnRef idx="2">
-            <a:schemeClr val="accent1">
-              <a:shade val="15000"/>
-            </a:schemeClr>
-          </a:lnRef>
-          <a:fillRef idx="1">
-            <a:schemeClr val="accent1"/>
-          </a:fillRef>
-          <a:effectRef idx="0">
-            <a:schemeClr val="accent1"/>
-          </a:effectRef>
-          <a:fontRef idx="minor">
-            <a:schemeClr val="lt1"/>
-          </a:fontRef>
-        </p:style>
-        <p:txBody>
-          <a:bodyPr rtlCol="0" anchor="ctr"/>
-          <a:lstStyle/>
-          <a:p>
-            <a:pPr algn="ctr"/>
-            <a:endParaRPr lang="nl-NL" sz="3124"/>
-          </a:p>
-        </p:txBody>
-      </p:sp>
-      <p:sp>
-        <p:nvSpPr>
-          <p:cNvPr id="10" name="Driehoek">
-            <a:extLst>
-              <a:ext uri="{FF2B5EF4-FFF2-40B4-BE49-F238E27FC236}">
-                <a16:creationId xmlns:a16="http://schemas.microsoft.com/office/drawing/2014/main" id="{D382B982-138B-EF5F-A4A3-F952DD1C516E}"/>
-              </a:ext>
-            </a:extLst>
-          </p:cNvPr>
-          <p:cNvSpPr/>
-          <p:nvPr userDrawn="1"/>
-        </p:nvSpPr>
-        <p:spPr>
-          <a:xfrm rot="10800000" flipH="1">
-            <a:off x="9719594" y="0"/>
-            <a:ext cx="576000" cy="1066800"/>
-          </a:xfrm>
-          <a:prstGeom prst="rtTriangle">
-            <a:avLst/>
-          </a:prstGeom>
-          <a:solidFill>
-            <a:schemeClr val="accent1"/>
-          </a:solidFill>
-          <a:ln>
-            <a:noFill/>
-          </a:ln>
-        </p:spPr>
-        <p:style>
-          <a:lnRef idx="2">
-            <a:schemeClr val="accent1">
-              <a:shade val="50000"/>
-            </a:schemeClr>
-          </a:lnRef>
-          <a:fillRef idx="1">
-            <a:schemeClr val="accent1"/>
-          </a:fillRef>
-          <a:effectRef idx="0">
-            <a:schemeClr val="accent1"/>
-          </a:effectRef>
-          <a:fontRef idx="minor">
-            <a:schemeClr val="lt1"/>
-          </a:fontRef>
-        </p:style>
-        <p:txBody>
-          <a:bodyPr rtlCol="0" anchor="ctr"/>
-          <a:lstStyle/>
-          <a:p>
-            <a:pPr algn="l"/>
-            <a:endParaRPr lang="en-US" sz="2391" b="1">
-              <a:latin typeface="+mn-lt"/>
-            </a:endParaRPr>
-          </a:p>
-        </p:txBody>
-      </p:sp>
-      <p:sp>
-        <p:nvSpPr>
-          <p:cNvPr id="11" name="Titelblok">
-            <a:extLst>
-              <a:ext uri="{FF2B5EF4-FFF2-40B4-BE49-F238E27FC236}">
-                <a16:creationId xmlns:a16="http://schemas.microsoft.com/office/drawing/2014/main" id="{25BB0762-1AD0-F5A1-E01E-F53682EB8F5D}"/>
-              </a:ext>
-            </a:extLst>
-          </p:cNvPr>
-          <p:cNvSpPr/>
-          <p:nvPr userDrawn="1"/>
-        </p:nvSpPr>
-        <p:spPr>
-          <a:xfrm>
-            <a:off x="1" y="0"/>
-            <a:ext cx="9719589" cy="1066800"/>
-          </a:xfrm>
-          <a:prstGeom prst="rect">
-            <a:avLst/>
-          </a:prstGeom>
-          <a:solidFill>
-            <a:schemeClr val="accent1"/>
-          </a:solidFill>
-          <a:ln>
-            <a:noFill/>
-          </a:ln>
-        </p:spPr>
-        <p:style>
-          <a:lnRef idx="2">
-            <a:schemeClr val="accent1">
-              <a:shade val="50000"/>
-            </a:schemeClr>
-          </a:lnRef>
-          <a:fillRef idx="1">
-            <a:schemeClr val="accent1"/>
-          </a:fillRef>
-          <a:effectRef idx="0">
-            <a:schemeClr val="accent1"/>
-          </a:effectRef>
-          <a:fontRef idx="minor">
-            <a:schemeClr val="lt1"/>
-          </a:fontRef>
-        </p:style>
-        <p:txBody>
-          <a:bodyPr rtlCol="0" anchor="ctr"/>
-          <a:lstStyle/>
-          <a:p>
-            <a:pPr marL="0" indent="360388" algn="l"/>
-            <a:r>
-              <a:rPr lang="nl-NL" sz="2400" b="1" noProof="0" dirty="0">
-                <a:latin typeface="+mj-lt"/>
-              </a:rPr>
-              <a:t>Tabel</a:t>
-            </a:r>
-          </a:p>
-        </p:txBody>
-      </p:sp>
-      <p:sp>
-        <p:nvSpPr>
-          <p:cNvPr id="13" name="Tekstvak">
-            <a:extLst>
-              <a:ext uri="{FF2B5EF4-FFF2-40B4-BE49-F238E27FC236}">
-                <a16:creationId xmlns:a16="http://schemas.microsoft.com/office/drawing/2014/main" id="{B5C74B2A-748B-0740-1934-6885F2B1E828}"/>
-              </a:ext>
-            </a:extLst>
-          </p:cNvPr>
-          <p:cNvSpPr txBox="1"/>
-          <p:nvPr userDrawn="1"/>
-        </p:nvSpPr>
-        <p:spPr>
-          <a:xfrm>
-            <a:off x="457218" y="1519201"/>
-            <a:ext cx="3456000" cy="577081"/>
-          </a:xfrm>
-          <a:prstGeom prst="rect">
-            <a:avLst/>
-          </a:prstGeom>
-          <a:noFill/>
-        </p:spPr>
-        <p:txBody>
-          <a:bodyPr rot="0" spcFirstLastPara="0" vert="horz" wrap="square" lIns="91440" tIns="45720" rIns="91440" bIns="45720" numCol="1" spcCol="0" rtlCol="0" fromWordArt="0" anchor="t" anchorCtr="0" forceAA="0" compatLnSpc="1">
-            <a:prstTxWarp prst="textNoShape">
-              <a:avLst/>
-            </a:prstTxWarp>
-            <a:spAutoFit/>
-          </a:bodyPr>
-          <a:lstStyle>
-            <a:defPPr>
-              <a:defRPr lang="nl-NL"/>
-            </a:defPPr>
-            <a:lvl1pPr marL="0" algn="l" defTabSz="839852" rtl="0" eaLnBrk="1" latinLnBrk="0" hangingPunct="1">
-              <a:defRPr sz="1653" kern="1200">
-                <a:solidFill>
-                  <a:schemeClr val="tx1"/>
-                </a:solidFill>
-                <a:latin typeface="+mn-lt"/>
-                <a:ea typeface="+mn-ea"/>
-                <a:cs typeface="+mn-cs"/>
-              </a:defRPr>
-            </a:lvl1pPr>
-            <a:lvl2pPr marL="419926" algn="l" defTabSz="839852" rtl="0" eaLnBrk="1" latinLnBrk="0" hangingPunct="1">
-              <a:defRPr sz="1653" kern="1200">
-                <a:solidFill>
-                  <a:schemeClr val="tx1"/>
-                </a:solidFill>
-                <a:latin typeface="+mn-lt"/>
-                <a:ea typeface="+mn-ea"/>
-                <a:cs typeface="+mn-cs"/>
-              </a:defRPr>
-            </a:lvl2pPr>
-            <a:lvl3pPr marL="839852" algn="l" defTabSz="839852" rtl="0" eaLnBrk="1" latinLnBrk="0" hangingPunct="1">
-              <a:defRPr sz="1653" kern="1200">
-                <a:solidFill>
-                  <a:schemeClr val="tx1"/>
-                </a:solidFill>
-                <a:latin typeface="+mn-lt"/>
-                <a:ea typeface="+mn-ea"/>
-                <a:cs typeface="+mn-cs"/>
-              </a:defRPr>
-            </a:lvl3pPr>
-            <a:lvl4pPr marL="1259779" algn="l" defTabSz="839852" rtl="0" eaLnBrk="1" latinLnBrk="0" hangingPunct="1">
-              <a:defRPr sz="1653" kern="1200">
-                <a:solidFill>
-                  <a:schemeClr val="tx1"/>
-                </a:solidFill>
-                <a:latin typeface="+mn-lt"/>
-                <a:ea typeface="+mn-ea"/>
-                <a:cs typeface="+mn-cs"/>
-              </a:defRPr>
-            </a:lvl4pPr>
-            <a:lvl5pPr marL="1679704" algn="l" defTabSz="839852" rtl="0" eaLnBrk="1" latinLnBrk="0" hangingPunct="1">
-              <a:defRPr sz="1653" kern="1200">
-                <a:solidFill>
-                  <a:schemeClr val="tx1"/>
-                </a:solidFill>
-                <a:latin typeface="+mn-lt"/>
-                <a:ea typeface="+mn-ea"/>
-                <a:cs typeface="+mn-cs"/>
-              </a:defRPr>
-            </a:lvl5pPr>
-            <a:lvl6pPr marL="2099630" algn="l" defTabSz="839852" rtl="0" eaLnBrk="1" latinLnBrk="0" hangingPunct="1">
-              <a:defRPr sz="1653" kern="1200">
-                <a:solidFill>
-                  <a:schemeClr val="tx1"/>
-                </a:solidFill>
-                <a:latin typeface="+mn-lt"/>
-                <a:ea typeface="+mn-ea"/>
-                <a:cs typeface="+mn-cs"/>
-              </a:defRPr>
-            </a:lvl6pPr>
-            <a:lvl7pPr marL="2519556" algn="l" defTabSz="839852" rtl="0" eaLnBrk="1" latinLnBrk="0" hangingPunct="1">
-              <a:defRPr sz="1653" kern="1200">
-                <a:solidFill>
-                  <a:schemeClr val="tx1"/>
-                </a:solidFill>
-                <a:latin typeface="+mn-lt"/>
-                <a:ea typeface="+mn-ea"/>
-                <a:cs typeface="+mn-cs"/>
-              </a:defRPr>
-            </a:lvl7pPr>
-            <a:lvl8pPr marL="2939482" algn="l" defTabSz="839852" rtl="0" eaLnBrk="1" latinLnBrk="0" hangingPunct="1">
-              <a:defRPr sz="1653" kern="1200">
-                <a:solidFill>
-                  <a:schemeClr val="tx1"/>
-                </a:solidFill>
-                <a:latin typeface="+mn-lt"/>
-                <a:ea typeface="+mn-ea"/>
-                <a:cs typeface="+mn-cs"/>
-              </a:defRPr>
-            </a:lvl8pPr>
-            <a:lvl9pPr marL="3359408" algn="l" defTabSz="839852" rtl="0" eaLnBrk="1" latinLnBrk="0" hangingPunct="1">
-              <a:defRPr sz="1653" kern="1200">
-                <a:solidFill>
-                  <a:schemeClr val="tx1"/>
-                </a:solidFill>
-                <a:latin typeface="+mn-lt"/>
-                <a:ea typeface="+mn-ea"/>
-                <a:cs typeface="+mn-cs"/>
-              </a:defRPr>
-            </a:lvl9pPr>
-          </a:lstStyle>
-          <a:p>
-            <a:pPr marL="0" marR="0" lvl="0" indent="0" algn="l" defTabSz="839909" rtl="0" eaLnBrk="1" fontAlgn="auto" latinLnBrk="0" hangingPunct="1">
-              <a:lnSpc>
-                <a:spcPct val="100000"/>
-              </a:lnSpc>
-              <a:spcBef>
-                <a:spcPts val="0"/>
-              </a:spcBef>
-              <a:spcAft>
-                <a:spcPts val="0"/>
-              </a:spcAft>
-              <a:buClrTx/>
-              <a:buSzTx/>
-              <a:buFontTx/>
-              <a:buNone/>
-              <a:tabLst/>
-              <a:defRPr/>
-            </a:pPr>
-            <a:r>
-              <a:rPr lang="nl-NL" sz="1050" b="1" kern="1200" dirty="0">
-                <a:solidFill>
-                  <a:schemeClr val="tx1"/>
-                </a:solidFill>
-                <a:latin typeface="+mn-lt"/>
-                <a:ea typeface="+mn-ea"/>
-                <a:cs typeface="+mn-cs"/>
-              </a:rPr>
-              <a:t>Tabel</a:t>
-            </a:r>
-          </a:p>
-          <a:p>
-            <a:pPr marL="0" marR="0" lvl="0" indent="0" algn="l" defTabSz="839909" rtl="0" eaLnBrk="1" fontAlgn="auto" latinLnBrk="0" hangingPunct="1">
-              <a:lnSpc>
-                <a:spcPct val="100000"/>
-              </a:lnSpc>
-              <a:spcBef>
-                <a:spcPts val="0"/>
-              </a:spcBef>
-              <a:spcAft>
-                <a:spcPts val="0"/>
-              </a:spcAft>
-              <a:buClrTx/>
-              <a:buSzTx/>
-              <a:buFontTx/>
-              <a:buNone/>
-              <a:tabLst/>
-              <a:defRPr/>
-            </a:pPr>
-            <a:endParaRPr lang="nl-NL" sz="1050" b="1" kern="1200" dirty="0">
-              <a:solidFill>
-                <a:schemeClr val="tx1"/>
-              </a:solidFill>
-              <a:latin typeface="+mn-lt"/>
-              <a:ea typeface="+mn-ea"/>
-              <a:cs typeface="+mn-cs"/>
-            </a:endParaRPr>
-          </a:p>
-          <a:p>
-            <a:pPr marL="0" marR="0" lvl="0" indent="0" algn="l" defTabSz="839909" rtl="0" eaLnBrk="1" fontAlgn="auto" latinLnBrk="0" hangingPunct="1">
-              <a:lnSpc>
-                <a:spcPct val="100000"/>
-              </a:lnSpc>
-              <a:spcBef>
-                <a:spcPts val="0"/>
-              </a:spcBef>
-              <a:spcAft>
-                <a:spcPts val="0"/>
-              </a:spcAft>
-              <a:buClrTx/>
-              <a:buSzTx/>
-              <a:buFontTx/>
-              <a:buNone/>
-              <a:tabLst/>
-              <a:defRPr/>
-            </a:pPr>
-            <a:r>
-              <a:rPr lang="nl-NL" sz="1050" b="0" kern="1200" dirty="0">
-                <a:solidFill>
-                  <a:schemeClr val="tx1"/>
-                </a:solidFill>
-                <a:latin typeface="+mn-lt"/>
-                <a:ea typeface="+mn-ea"/>
-                <a:cs typeface="+mn-cs"/>
-              </a:rPr>
-              <a:t>Tekst.</a:t>
-            </a:r>
-          </a:p>
-        </p:txBody>
-      </p:sp>
-      <p:cxnSp>
-        <p:nvCxnSpPr>
-          <p:cNvPr id="20" name="Rechter scheidingslijn">
-            <a:extLst>
-              <a:ext uri="{FF2B5EF4-FFF2-40B4-BE49-F238E27FC236}">
-                <a16:creationId xmlns:a16="http://schemas.microsoft.com/office/drawing/2014/main" id="{0AECDC42-FE32-55F5-E0D6-9EB431CF9F43}"/>
-              </a:ext>
-            </a:extLst>
-          </p:cNvPr>
-          <p:cNvCxnSpPr>
-            <a:cxnSpLocks/>
-          </p:cNvCxnSpPr>
-          <p:nvPr userDrawn="1"/>
-        </p:nvCxnSpPr>
-        <p:spPr>
-          <a:xfrm flipV="1">
-            <a:off x="8051825" y="1519200"/>
-            <a:ext cx="0" cy="4881600"/>
-          </a:xfrm>
-          <a:prstGeom prst="line">
-            <a:avLst/>
-          </a:prstGeom>
-          <a:ln w="12700">
-            <a:solidFill>
-              <a:schemeClr val="tx2">
-                <a:lumMod val="20000"/>
-                <a:lumOff val="80000"/>
-              </a:schemeClr>
-            </a:solidFill>
-          </a:ln>
-        </p:spPr>
-        <p:style>
-          <a:lnRef idx="1">
-            <a:schemeClr val="accent1"/>
-          </a:lnRef>
-          <a:fillRef idx="0">
-            <a:schemeClr val="accent1"/>
-          </a:fillRef>
-          <a:effectRef idx="0">
-            <a:schemeClr val="accent1"/>
-          </a:effectRef>
-          <a:fontRef idx="minor">
-            <a:schemeClr val="tx1"/>
-          </a:fontRef>
-        </p:style>
-      </p:cxnSp>
-      <p:cxnSp>
-        <p:nvCxnSpPr>
-          <p:cNvPr id="21" name="Linker scheidingslijn">
-            <a:extLst>
-              <a:ext uri="{FF2B5EF4-FFF2-40B4-BE49-F238E27FC236}">
-                <a16:creationId xmlns:a16="http://schemas.microsoft.com/office/drawing/2014/main" id="{875B34E6-233B-E234-77F0-CA5380CB8849}"/>
-              </a:ext>
-            </a:extLst>
-          </p:cNvPr>
-          <p:cNvCxnSpPr>
-            <a:cxnSpLocks/>
-          </p:cNvCxnSpPr>
-          <p:nvPr userDrawn="1"/>
-        </p:nvCxnSpPr>
-        <p:spPr>
-          <a:xfrm flipV="1">
-            <a:off x="4140175" y="1519200"/>
-            <a:ext cx="0" cy="4881600"/>
-          </a:xfrm>
-          <a:prstGeom prst="line">
-            <a:avLst/>
-          </a:prstGeom>
-          <a:ln w="12700">
-            <a:solidFill>
-              <a:schemeClr val="tx2">
-                <a:lumMod val="20000"/>
-                <a:lumOff val="80000"/>
-              </a:schemeClr>
-            </a:solidFill>
-          </a:ln>
-        </p:spPr>
-        <p:style>
-          <a:lnRef idx="1">
-            <a:schemeClr val="accent1"/>
-          </a:lnRef>
-          <a:fillRef idx="0">
-            <a:schemeClr val="accent1"/>
-          </a:fillRef>
-          <a:effectRef idx="0">
-            <a:schemeClr val="accent1"/>
-          </a:effectRef>
-          <a:fontRef idx="minor">
-            <a:schemeClr val="tx1"/>
-          </a:fontRef>
-        </p:style>
-      </p:cxnSp>
-      <p:sp>
-        <p:nvSpPr>
-          <p:cNvPr id="14" name="Tabel 4">
-            <a:extLst>
-              <a:ext uri="{FF2B5EF4-FFF2-40B4-BE49-F238E27FC236}">
-                <a16:creationId xmlns:a16="http://schemas.microsoft.com/office/drawing/2014/main" id="{5571B4FA-5AE5-9A9D-0255-A58C8CD0F28C}"/>
-              </a:ext>
-            </a:extLst>
-          </p:cNvPr>
-          <p:cNvSpPr>
-            <a:spLocks noGrp="1"/>
-          </p:cNvSpPr>
-          <p:nvPr>
-            <p:ph type="chart" sz="quarter" idx="17"/>
-          </p:nvPr>
-        </p:nvSpPr>
-        <p:spPr>
-          <a:xfrm>
-            <a:off x="8278669" y="4024800"/>
-            <a:ext cx="3454371" cy="2376000"/>
-          </a:xfrm>
-          <a:prstGeom prst="rect">
-            <a:avLst/>
-          </a:prstGeom>
-        </p:spPr>
-        <p:txBody>
-          <a:bodyPr/>
-          <a:lstStyle>
-            <a:lvl1pPr marL="0" indent="0">
-              <a:buNone/>
-              <a:defRPr>
-                <a:latin typeface="+mn-lt"/>
-              </a:defRPr>
-            </a:lvl1pPr>
-          </a:lstStyle>
-          <a:p>
-            <a:endParaRPr lang="nl-NL"/>
-          </a:p>
-        </p:txBody>
-      </p:sp>
-      <p:sp>
-        <p:nvSpPr>
-          <p:cNvPr id="15" name="Tabel 3">
-            <a:extLst>
-              <a:ext uri="{FF2B5EF4-FFF2-40B4-BE49-F238E27FC236}">
-                <a16:creationId xmlns:a16="http://schemas.microsoft.com/office/drawing/2014/main" id="{C2E38561-545A-6019-51B5-5CBFC5E5C694}"/>
-              </a:ext>
-            </a:extLst>
-          </p:cNvPr>
-          <p:cNvSpPr>
-            <a:spLocks noGrp="1"/>
-          </p:cNvSpPr>
-          <p:nvPr>
-            <p:ph type="chart" sz="quarter" idx="16"/>
-          </p:nvPr>
-        </p:nvSpPr>
-        <p:spPr>
-          <a:xfrm>
-            <a:off x="4370400" y="4024800"/>
-            <a:ext cx="3456000" cy="2376000"/>
-          </a:xfrm>
-          <a:prstGeom prst="rect">
-            <a:avLst/>
-          </a:prstGeom>
-        </p:spPr>
-        <p:txBody>
-          <a:bodyPr/>
-          <a:lstStyle>
-            <a:lvl1pPr marL="0" indent="0">
-              <a:buNone/>
-              <a:defRPr>
-                <a:latin typeface="+mn-lt"/>
-              </a:defRPr>
-            </a:lvl1pPr>
-          </a:lstStyle>
-          <a:p>
-            <a:endParaRPr lang="nl-NL"/>
-          </a:p>
-        </p:txBody>
-      </p:sp>
-      <p:sp>
-        <p:nvSpPr>
-          <p:cNvPr id="16" name="Tabel 2">
-            <a:extLst>
-              <a:ext uri="{FF2B5EF4-FFF2-40B4-BE49-F238E27FC236}">
-                <a16:creationId xmlns:a16="http://schemas.microsoft.com/office/drawing/2014/main" id="{264F8129-EEB5-1B75-B965-D4B83E379692}"/>
-              </a:ext>
-            </a:extLst>
-          </p:cNvPr>
-          <p:cNvSpPr>
-            <a:spLocks noGrp="1"/>
-          </p:cNvSpPr>
-          <p:nvPr>
-            <p:ph type="chart" sz="quarter" idx="15"/>
-          </p:nvPr>
-        </p:nvSpPr>
-        <p:spPr>
-          <a:xfrm>
-            <a:off x="8280294" y="1519200"/>
-            <a:ext cx="3454373" cy="2376000"/>
-          </a:xfrm>
-          <a:prstGeom prst="rect">
-            <a:avLst/>
-          </a:prstGeom>
-        </p:spPr>
-        <p:txBody>
-          <a:bodyPr/>
-          <a:lstStyle>
-            <a:lvl1pPr marL="0" indent="0">
-              <a:buNone/>
-              <a:defRPr>
-                <a:latin typeface="+mn-lt"/>
-              </a:defRPr>
-            </a:lvl1pPr>
-          </a:lstStyle>
-          <a:p>
-            <a:endParaRPr lang="nl-NL"/>
-          </a:p>
-        </p:txBody>
-      </p:sp>
-      <p:sp>
-        <p:nvSpPr>
-          <p:cNvPr id="17" name="Tabel 1">
-            <a:extLst>
-              <a:ext uri="{FF2B5EF4-FFF2-40B4-BE49-F238E27FC236}">
-                <a16:creationId xmlns:a16="http://schemas.microsoft.com/office/drawing/2014/main" id="{3D7EF6FF-2FDF-DFF5-CEBD-A0147DE93889}"/>
-              </a:ext>
-            </a:extLst>
-          </p:cNvPr>
-          <p:cNvSpPr>
-            <a:spLocks noGrp="1"/>
-          </p:cNvSpPr>
-          <p:nvPr>
-            <p:ph type="chart" sz="quarter" idx="14"/>
-          </p:nvPr>
-        </p:nvSpPr>
-        <p:spPr>
-          <a:xfrm>
-            <a:off x="4368813" y="1519200"/>
-            <a:ext cx="3454374" cy="2376000"/>
-          </a:xfrm>
-          <a:prstGeom prst="rect">
-            <a:avLst/>
-          </a:prstGeom>
-        </p:spPr>
-        <p:txBody>
-          <a:bodyPr/>
-          <a:lstStyle>
-            <a:lvl1pPr marL="0" indent="0">
-              <a:buNone/>
-              <a:defRPr>
-                <a:latin typeface="+mn-lt"/>
-              </a:defRPr>
-            </a:lvl1pPr>
-          </a:lstStyle>
-          <a:p>
-            <a:endParaRPr lang="nl-NL" dirty="0"/>
-          </a:p>
-        </p:txBody>
-      </p:sp>
-    </p:spTree>
-    <p:extLst>
-      <p:ext uri="{BB962C8B-B14F-4D97-AF65-F5344CB8AC3E}">
-        <p14:creationId xmlns:p14="http://schemas.microsoft.com/office/powerpoint/2010/main" val="3849775906"/>
       </p:ext>
     </p:extLst>
   </p:cSld>
@@ -9838,13 +10355,13 @@
             <p:nvPr userDrawn="1"/>
           </p:nvPicPr>
           <p:blipFill>
-            <a:blip r:embed="rId11" cstate="print">
+            <a:blip r:embed="rId12" cstate="print">
               <a:extLst>
                 <a:ext uri="{28A0092B-C50C-407E-A947-70E740481C1C}">
                   <a14:useLocalDpi xmlns:a14="http://schemas.microsoft.com/office/drawing/2010/main" val="0"/>
                 </a:ext>
                 <a:ext uri="{96DAC541-7B7A-43D3-8B79-37D633B846F1}">
-                  <asvg:svgBlip xmlns:asvg="http://schemas.microsoft.com/office/drawing/2016/SVG/main" r:embed="rId12"/>
+                  <asvg:svgBlip xmlns:asvg="http://schemas.microsoft.com/office/drawing/2016/SVG/main" r:embed="rId13"/>
                 </a:ext>
               </a:extLst>
             </a:blip>
@@ -9873,14 +10390,15 @@
   <p:clrMap bg1="lt1" tx1="dk1" bg2="lt2" tx2="dk2" accent1="accent1" accent2="accent2" accent3="accent3" accent4="accent4" accent5="accent5" accent6="accent6" hlink="hlink" folHlink="folHlink"/>
   <p:sldLayoutIdLst>
     <p:sldLayoutId id="2147483702" r:id="rId1"/>
-    <p:sldLayoutId id="2147483706" r:id="rId2"/>
-    <p:sldLayoutId id="2147483707" r:id="rId3"/>
-    <p:sldLayoutId id="2147483703" r:id="rId4"/>
-    <p:sldLayoutId id="2147483705" r:id="rId5"/>
-    <p:sldLayoutId id="2147483701" r:id="rId6"/>
-    <p:sldLayoutId id="2147483653" r:id="rId7"/>
-    <p:sldLayoutId id="2147483708" r:id="rId8"/>
-    <p:sldLayoutId id="2147483704" r:id="rId9"/>
+    <p:sldLayoutId id="2147483709" r:id="rId2"/>
+    <p:sldLayoutId id="2147483706" r:id="rId3"/>
+    <p:sldLayoutId id="2147483707" r:id="rId4"/>
+    <p:sldLayoutId id="2147483703" r:id="rId5"/>
+    <p:sldLayoutId id="2147483705" r:id="rId6"/>
+    <p:sldLayoutId id="2147483701" r:id="rId7"/>
+    <p:sldLayoutId id="2147483653" r:id="rId8"/>
+    <p:sldLayoutId id="2147483708" r:id="rId9"/>
+    <p:sldLayoutId id="2147483704" r:id="rId10"/>
   </p:sldLayoutIdLst>
   <p:txStyles>
     <p:titleStyle>
@@ -10372,6 +10890,36 @@
     <p:extLst>
       <p:ext uri="{BB962C8B-B14F-4D97-AF65-F5344CB8AC3E}">
         <p14:creationId xmlns:p14="http://schemas.microsoft.com/office/powerpoint/2010/main" val="1769976180"/>
+      </p:ext>
+    </p:extLst>
+  </p:cSld>
+  <p:clrMapOvr>
+    <a:masterClrMapping/>
+  </p:clrMapOvr>
+</p:sld>
+</file>
+
+<file path=ppt/slides/slide9.xml><?xml version="1.0" encoding="utf-8"?>
+<p:sld xmlns:a="http://schemas.openxmlformats.org/drawingml/2006/main" xmlns:r="http://schemas.openxmlformats.org/officeDocument/2006/relationships" xmlns:p="http://schemas.openxmlformats.org/presentationml/2006/main">
+  <p:cSld>
+    <p:spTree>
+      <p:nvGrpSpPr>
+        <p:cNvPr id="1" name=""/>
+        <p:cNvGrpSpPr/>
+        <p:nvPr/>
+      </p:nvGrpSpPr>
+      <p:grpSpPr>
+        <a:xfrm>
+          <a:off x="0" y="0"/>
+          <a:ext cx="0" cy="0"/>
+          <a:chOff x="0" y="0"/>
+          <a:chExt cx="0" cy="0"/>
+        </a:xfrm>
+      </p:grpSpPr>
+    </p:spTree>
+    <p:extLst>
+      <p:ext uri="{BB962C8B-B14F-4D97-AF65-F5344CB8AC3E}">
+        <p14:creationId xmlns:p14="http://schemas.microsoft.com/office/powerpoint/2010/main" val="1857189599"/>
       </p:ext>
     </p:extLst>
   </p:cSld>

</xml_diff>